<commit_message>
Fixed wrong info in slides
</commit_message>
<xml_diff>
--- a/Week5/Week5.pptx
+++ b/Week5/Week5.pptx
@@ -166,7 +166,7 @@
           <p:cNvPr id="2" name="Title 1">
             <a:extLst>
               <a:ext uri="{FF2B5EF4-FFF2-40B4-BE49-F238E27FC236}">
-                <a16:creationId xmlns:a16="http://schemas.microsoft.com/office/drawing/2014/main" xmlns="" id="{82051A5C-07DD-468F-99F6-2F3EA9DE21ED}"/>
+                <a16:creationId xmlns="" xmlns:a16="http://schemas.microsoft.com/office/drawing/2014/main" id="{82051A5C-07DD-468F-99F6-2F3EA9DE21ED}"/>
               </a:ext>
             </a:extLst>
           </p:cNvPr>
@@ -203,7 +203,7 @@
           <p:cNvPr id="3" name="Subtitle 2">
             <a:extLst>
               <a:ext uri="{FF2B5EF4-FFF2-40B4-BE49-F238E27FC236}">
-                <a16:creationId xmlns:a16="http://schemas.microsoft.com/office/drawing/2014/main" xmlns="" id="{DFE018D2-197D-4D4F-90F5-70B95DCEF93F}"/>
+                <a16:creationId xmlns="" xmlns:a16="http://schemas.microsoft.com/office/drawing/2014/main" id="{DFE018D2-197D-4D4F-90F5-70B95DCEF93F}"/>
               </a:ext>
             </a:extLst>
           </p:cNvPr>
@@ -273,7 +273,7 @@
           <p:cNvPr id="4" name="Date Placeholder 3">
             <a:extLst>
               <a:ext uri="{FF2B5EF4-FFF2-40B4-BE49-F238E27FC236}">
-                <a16:creationId xmlns:a16="http://schemas.microsoft.com/office/drawing/2014/main" xmlns="" id="{ED6B904D-B612-41D4-AD36-A03575DE1189}"/>
+                <a16:creationId xmlns="" xmlns:a16="http://schemas.microsoft.com/office/drawing/2014/main" id="{ED6B904D-B612-41D4-AD36-A03575DE1189}"/>
               </a:ext>
             </a:extLst>
           </p:cNvPr>
@@ -291,7 +291,7 @@
           <a:p>
             <a:fld id="{F1EECB64-B6F4-4446-ADE9-F08E6B5CF5C8}" type="datetimeFigureOut">
               <a:rPr lang="en-US" smtClean="0"/>
-              <a:t>1/29/2021</a:t>
+              <a:t>1/30/2021</a:t>
             </a:fld>
             <a:endParaRPr lang="en-US"/>
           </a:p>
@@ -302,7 +302,7 @@
           <p:cNvPr id="5" name="Footer Placeholder 4">
             <a:extLst>
               <a:ext uri="{FF2B5EF4-FFF2-40B4-BE49-F238E27FC236}">
-                <a16:creationId xmlns:a16="http://schemas.microsoft.com/office/drawing/2014/main" xmlns="" id="{0D75345C-45A6-4D0B-AD4C-3A5B392EEB53}"/>
+                <a16:creationId xmlns="" xmlns:a16="http://schemas.microsoft.com/office/drawing/2014/main" id="{0D75345C-45A6-4D0B-AD4C-3A5B392EEB53}"/>
               </a:ext>
             </a:extLst>
           </p:cNvPr>
@@ -327,7 +327,7 @@
           <p:cNvPr id="6" name="Slide Number Placeholder 5">
             <a:extLst>
               <a:ext uri="{FF2B5EF4-FFF2-40B4-BE49-F238E27FC236}">
-                <a16:creationId xmlns:a16="http://schemas.microsoft.com/office/drawing/2014/main" xmlns="" id="{26582E30-097E-4437-97EF-9825D58F3A09}"/>
+                <a16:creationId xmlns="" xmlns:a16="http://schemas.microsoft.com/office/drawing/2014/main" id="{26582E30-097E-4437-97EF-9825D58F3A09}"/>
               </a:ext>
             </a:extLst>
           </p:cNvPr>
@@ -386,7 +386,7 @@
           <p:cNvPr id="2" name="Title 1">
             <a:extLst>
               <a:ext uri="{FF2B5EF4-FFF2-40B4-BE49-F238E27FC236}">
-                <a16:creationId xmlns:a16="http://schemas.microsoft.com/office/drawing/2014/main" xmlns="" id="{B8B76BC4-BFC9-4CE5-80F1-6FCAF3ED8169}"/>
+                <a16:creationId xmlns="" xmlns:a16="http://schemas.microsoft.com/office/drawing/2014/main" id="{B8B76BC4-BFC9-4CE5-80F1-6FCAF3ED8169}"/>
               </a:ext>
             </a:extLst>
           </p:cNvPr>
@@ -414,7 +414,7 @@
           <p:cNvPr id="3" name="Vertical Text Placeholder 2">
             <a:extLst>
               <a:ext uri="{FF2B5EF4-FFF2-40B4-BE49-F238E27FC236}">
-                <a16:creationId xmlns:a16="http://schemas.microsoft.com/office/drawing/2014/main" xmlns="" id="{644D07DB-7D58-4409-920D-F1713412D4B7}"/>
+                <a16:creationId xmlns="" xmlns:a16="http://schemas.microsoft.com/office/drawing/2014/main" id="{644D07DB-7D58-4409-920D-F1713412D4B7}"/>
               </a:ext>
             </a:extLst>
           </p:cNvPr>
@@ -471,7 +471,7 @@
           <p:cNvPr id="4" name="Date Placeholder 3">
             <a:extLst>
               <a:ext uri="{FF2B5EF4-FFF2-40B4-BE49-F238E27FC236}">
-                <a16:creationId xmlns:a16="http://schemas.microsoft.com/office/drawing/2014/main" xmlns="" id="{CFAF477F-DF1C-42A2-8034-AD6E16906F82}"/>
+                <a16:creationId xmlns="" xmlns:a16="http://schemas.microsoft.com/office/drawing/2014/main" id="{CFAF477F-DF1C-42A2-8034-AD6E16906F82}"/>
               </a:ext>
             </a:extLst>
           </p:cNvPr>
@@ -489,7 +489,7 @@
           <a:p>
             <a:fld id="{F1EECB64-B6F4-4446-ADE9-F08E6B5CF5C8}" type="datetimeFigureOut">
               <a:rPr lang="en-US" smtClean="0"/>
-              <a:t>1/29/2021</a:t>
+              <a:t>1/30/2021</a:t>
             </a:fld>
             <a:endParaRPr lang="en-US"/>
           </a:p>
@@ -500,7 +500,7 @@
           <p:cNvPr id="5" name="Footer Placeholder 4">
             <a:extLst>
               <a:ext uri="{FF2B5EF4-FFF2-40B4-BE49-F238E27FC236}">
-                <a16:creationId xmlns:a16="http://schemas.microsoft.com/office/drawing/2014/main" xmlns="" id="{6ADB519F-D0BC-4FF7-B4BC-B3827F85C575}"/>
+                <a16:creationId xmlns="" xmlns:a16="http://schemas.microsoft.com/office/drawing/2014/main" id="{6ADB519F-D0BC-4FF7-B4BC-B3827F85C575}"/>
               </a:ext>
             </a:extLst>
           </p:cNvPr>
@@ -525,7 +525,7 @@
           <p:cNvPr id="6" name="Slide Number Placeholder 5">
             <a:extLst>
               <a:ext uri="{FF2B5EF4-FFF2-40B4-BE49-F238E27FC236}">
-                <a16:creationId xmlns:a16="http://schemas.microsoft.com/office/drawing/2014/main" xmlns="" id="{259037DF-33CF-4195-8B9E-F756BCD066E3}"/>
+                <a16:creationId xmlns="" xmlns:a16="http://schemas.microsoft.com/office/drawing/2014/main" id="{259037DF-33CF-4195-8B9E-F756BCD066E3}"/>
               </a:ext>
             </a:extLst>
           </p:cNvPr>
@@ -584,7 +584,7 @@
           <p:cNvPr id="2" name="Vertical Title 1">
             <a:extLst>
               <a:ext uri="{FF2B5EF4-FFF2-40B4-BE49-F238E27FC236}">
-                <a16:creationId xmlns:a16="http://schemas.microsoft.com/office/drawing/2014/main" xmlns="" id="{059FB834-95C9-4480-A757-B2783056664E}"/>
+                <a16:creationId xmlns="" xmlns:a16="http://schemas.microsoft.com/office/drawing/2014/main" id="{059FB834-95C9-4480-A757-B2783056664E}"/>
               </a:ext>
             </a:extLst>
           </p:cNvPr>
@@ -617,7 +617,7 @@
           <p:cNvPr id="3" name="Vertical Text Placeholder 2">
             <a:extLst>
               <a:ext uri="{FF2B5EF4-FFF2-40B4-BE49-F238E27FC236}">
-                <a16:creationId xmlns:a16="http://schemas.microsoft.com/office/drawing/2014/main" xmlns="" id="{5D69A514-8BBB-46DA-B647-7B5733C174E6}"/>
+                <a16:creationId xmlns="" xmlns:a16="http://schemas.microsoft.com/office/drawing/2014/main" id="{5D69A514-8BBB-46DA-B647-7B5733C174E6}"/>
               </a:ext>
             </a:extLst>
           </p:cNvPr>
@@ -679,7 +679,7 @@
           <p:cNvPr id="4" name="Date Placeholder 3">
             <a:extLst>
               <a:ext uri="{FF2B5EF4-FFF2-40B4-BE49-F238E27FC236}">
-                <a16:creationId xmlns:a16="http://schemas.microsoft.com/office/drawing/2014/main" xmlns="" id="{E57ED3D9-4568-4A3D-9DAB-AEDD5A034667}"/>
+                <a16:creationId xmlns="" xmlns:a16="http://schemas.microsoft.com/office/drawing/2014/main" id="{E57ED3D9-4568-4A3D-9DAB-AEDD5A034667}"/>
               </a:ext>
             </a:extLst>
           </p:cNvPr>
@@ -697,7 +697,7 @@
           <a:p>
             <a:fld id="{F1EECB64-B6F4-4446-ADE9-F08E6B5CF5C8}" type="datetimeFigureOut">
               <a:rPr lang="en-US" smtClean="0"/>
-              <a:t>1/29/2021</a:t>
+              <a:t>1/30/2021</a:t>
             </a:fld>
             <a:endParaRPr lang="en-US"/>
           </a:p>
@@ -708,7 +708,7 @@
           <p:cNvPr id="5" name="Footer Placeholder 4">
             <a:extLst>
               <a:ext uri="{FF2B5EF4-FFF2-40B4-BE49-F238E27FC236}">
-                <a16:creationId xmlns:a16="http://schemas.microsoft.com/office/drawing/2014/main" xmlns="" id="{35167B70-856C-4E56-B96A-23CB2A7B6D22}"/>
+                <a16:creationId xmlns="" xmlns:a16="http://schemas.microsoft.com/office/drawing/2014/main" id="{35167B70-856C-4E56-B96A-23CB2A7B6D22}"/>
               </a:ext>
             </a:extLst>
           </p:cNvPr>
@@ -733,7 +733,7 @@
           <p:cNvPr id="6" name="Slide Number Placeholder 5">
             <a:extLst>
               <a:ext uri="{FF2B5EF4-FFF2-40B4-BE49-F238E27FC236}">
-                <a16:creationId xmlns:a16="http://schemas.microsoft.com/office/drawing/2014/main" xmlns="" id="{E9AF14E9-42A2-4073-BC52-973FBE2FB434}"/>
+                <a16:creationId xmlns="" xmlns:a16="http://schemas.microsoft.com/office/drawing/2014/main" id="{E9AF14E9-42A2-4073-BC52-973FBE2FB434}"/>
               </a:ext>
             </a:extLst>
           </p:cNvPr>
@@ -792,7 +792,7 @@
           <p:cNvPr id="2" name="Title 1">
             <a:extLst>
               <a:ext uri="{FF2B5EF4-FFF2-40B4-BE49-F238E27FC236}">
-                <a16:creationId xmlns:a16="http://schemas.microsoft.com/office/drawing/2014/main" xmlns="" id="{B1E63BA9-0847-4F7B-AF13-2818018403F1}"/>
+                <a16:creationId xmlns="" xmlns:a16="http://schemas.microsoft.com/office/drawing/2014/main" id="{B1E63BA9-0847-4F7B-AF13-2818018403F1}"/>
               </a:ext>
             </a:extLst>
           </p:cNvPr>
@@ -820,7 +820,7 @@
           <p:cNvPr id="3" name="Content Placeholder 2">
             <a:extLst>
               <a:ext uri="{FF2B5EF4-FFF2-40B4-BE49-F238E27FC236}">
-                <a16:creationId xmlns:a16="http://schemas.microsoft.com/office/drawing/2014/main" xmlns="" id="{812BBE59-0651-41F5-9C6F-529545AF13D4}"/>
+                <a16:creationId xmlns="" xmlns:a16="http://schemas.microsoft.com/office/drawing/2014/main" id="{812BBE59-0651-41F5-9C6F-529545AF13D4}"/>
               </a:ext>
             </a:extLst>
           </p:cNvPr>
@@ -877,7 +877,7 @@
           <p:cNvPr id="4" name="Date Placeholder 3">
             <a:extLst>
               <a:ext uri="{FF2B5EF4-FFF2-40B4-BE49-F238E27FC236}">
-                <a16:creationId xmlns:a16="http://schemas.microsoft.com/office/drawing/2014/main" xmlns="" id="{F17BBDCA-A138-45C3-9046-13077E0C747C}"/>
+                <a16:creationId xmlns="" xmlns:a16="http://schemas.microsoft.com/office/drawing/2014/main" id="{F17BBDCA-A138-45C3-9046-13077E0C747C}"/>
               </a:ext>
             </a:extLst>
           </p:cNvPr>
@@ -895,7 +895,7 @@
           <a:p>
             <a:fld id="{F1EECB64-B6F4-4446-ADE9-F08E6B5CF5C8}" type="datetimeFigureOut">
               <a:rPr lang="en-US" smtClean="0"/>
-              <a:t>1/29/2021</a:t>
+              <a:t>1/30/2021</a:t>
             </a:fld>
             <a:endParaRPr lang="en-US"/>
           </a:p>
@@ -906,7 +906,7 @@
           <p:cNvPr id="5" name="Footer Placeholder 4">
             <a:extLst>
               <a:ext uri="{FF2B5EF4-FFF2-40B4-BE49-F238E27FC236}">
-                <a16:creationId xmlns:a16="http://schemas.microsoft.com/office/drawing/2014/main" xmlns="" id="{8F2E5B07-B858-410F-8FAB-9B526ACF4E7D}"/>
+                <a16:creationId xmlns="" xmlns:a16="http://schemas.microsoft.com/office/drawing/2014/main" id="{8F2E5B07-B858-410F-8FAB-9B526ACF4E7D}"/>
               </a:ext>
             </a:extLst>
           </p:cNvPr>
@@ -931,7 +931,7 @@
           <p:cNvPr id="6" name="Slide Number Placeholder 5">
             <a:extLst>
               <a:ext uri="{FF2B5EF4-FFF2-40B4-BE49-F238E27FC236}">
-                <a16:creationId xmlns:a16="http://schemas.microsoft.com/office/drawing/2014/main" xmlns="" id="{82EE9B6C-CFD0-4566-9010-ED1DCC26F6FB}"/>
+                <a16:creationId xmlns="" xmlns:a16="http://schemas.microsoft.com/office/drawing/2014/main" id="{82EE9B6C-CFD0-4566-9010-ED1DCC26F6FB}"/>
               </a:ext>
             </a:extLst>
           </p:cNvPr>
@@ -990,7 +990,7 @@
           <p:cNvPr id="2" name="Title 1">
             <a:extLst>
               <a:ext uri="{FF2B5EF4-FFF2-40B4-BE49-F238E27FC236}">
-                <a16:creationId xmlns:a16="http://schemas.microsoft.com/office/drawing/2014/main" xmlns="" id="{86FCFC42-A540-4ED2-8585-5DDAD553484C}"/>
+                <a16:creationId xmlns="" xmlns:a16="http://schemas.microsoft.com/office/drawing/2014/main" id="{86FCFC42-A540-4ED2-8585-5DDAD553484C}"/>
               </a:ext>
             </a:extLst>
           </p:cNvPr>
@@ -1027,7 +1027,7 @@
           <p:cNvPr id="3" name="Text Placeholder 2">
             <a:extLst>
               <a:ext uri="{FF2B5EF4-FFF2-40B4-BE49-F238E27FC236}">
-                <a16:creationId xmlns:a16="http://schemas.microsoft.com/office/drawing/2014/main" xmlns="" id="{466EE004-5CD6-42AB-AF11-1A0F4EFD9AC9}"/>
+                <a16:creationId xmlns="" xmlns:a16="http://schemas.microsoft.com/office/drawing/2014/main" id="{466EE004-5CD6-42AB-AF11-1A0F4EFD9AC9}"/>
               </a:ext>
             </a:extLst>
           </p:cNvPr>
@@ -1152,7 +1152,7 @@
           <p:cNvPr id="4" name="Date Placeholder 3">
             <a:extLst>
               <a:ext uri="{FF2B5EF4-FFF2-40B4-BE49-F238E27FC236}">
-                <a16:creationId xmlns:a16="http://schemas.microsoft.com/office/drawing/2014/main" xmlns="" id="{B7A3B996-3FF7-4E3C-B51B-793C575BD3AF}"/>
+                <a16:creationId xmlns="" xmlns:a16="http://schemas.microsoft.com/office/drawing/2014/main" id="{B7A3B996-3FF7-4E3C-B51B-793C575BD3AF}"/>
               </a:ext>
             </a:extLst>
           </p:cNvPr>
@@ -1170,7 +1170,7 @@
           <a:p>
             <a:fld id="{F1EECB64-B6F4-4446-ADE9-F08E6B5CF5C8}" type="datetimeFigureOut">
               <a:rPr lang="en-US" smtClean="0"/>
-              <a:t>1/29/2021</a:t>
+              <a:t>1/30/2021</a:t>
             </a:fld>
             <a:endParaRPr lang="en-US"/>
           </a:p>
@@ -1181,7 +1181,7 @@
           <p:cNvPr id="5" name="Footer Placeholder 4">
             <a:extLst>
               <a:ext uri="{FF2B5EF4-FFF2-40B4-BE49-F238E27FC236}">
-                <a16:creationId xmlns:a16="http://schemas.microsoft.com/office/drawing/2014/main" xmlns="" id="{8E3948AC-3315-40CF-B935-13501EC854E9}"/>
+                <a16:creationId xmlns="" xmlns:a16="http://schemas.microsoft.com/office/drawing/2014/main" id="{8E3948AC-3315-40CF-B935-13501EC854E9}"/>
               </a:ext>
             </a:extLst>
           </p:cNvPr>
@@ -1206,7 +1206,7 @@
           <p:cNvPr id="6" name="Slide Number Placeholder 5">
             <a:extLst>
               <a:ext uri="{FF2B5EF4-FFF2-40B4-BE49-F238E27FC236}">
-                <a16:creationId xmlns:a16="http://schemas.microsoft.com/office/drawing/2014/main" xmlns="" id="{4A14D325-32BD-40E9-BFE9-2FCCE3C5B6D2}"/>
+                <a16:creationId xmlns="" xmlns:a16="http://schemas.microsoft.com/office/drawing/2014/main" id="{4A14D325-32BD-40E9-BFE9-2FCCE3C5B6D2}"/>
               </a:ext>
             </a:extLst>
           </p:cNvPr>
@@ -1265,7 +1265,7 @@
           <p:cNvPr id="2" name="Title 1">
             <a:extLst>
               <a:ext uri="{FF2B5EF4-FFF2-40B4-BE49-F238E27FC236}">
-                <a16:creationId xmlns:a16="http://schemas.microsoft.com/office/drawing/2014/main" xmlns="" id="{7CA363D7-D7FC-4514-ABB2-4961FC7DA374}"/>
+                <a16:creationId xmlns="" xmlns:a16="http://schemas.microsoft.com/office/drawing/2014/main" id="{7CA363D7-D7FC-4514-ABB2-4961FC7DA374}"/>
               </a:ext>
             </a:extLst>
           </p:cNvPr>
@@ -1293,7 +1293,7 @@
           <p:cNvPr id="3" name="Content Placeholder 2">
             <a:extLst>
               <a:ext uri="{FF2B5EF4-FFF2-40B4-BE49-F238E27FC236}">
-                <a16:creationId xmlns:a16="http://schemas.microsoft.com/office/drawing/2014/main" xmlns="" id="{49AE73EE-BCDC-4306-9F8B-86C78200BF2C}"/>
+                <a16:creationId xmlns="" xmlns:a16="http://schemas.microsoft.com/office/drawing/2014/main" id="{49AE73EE-BCDC-4306-9F8B-86C78200BF2C}"/>
               </a:ext>
             </a:extLst>
           </p:cNvPr>
@@ -1355,7 +1355,7 @@
           <p:cNvPr id="4" name="Content Placeholder 3">
             <a:extLst>
               <a:ext uri="{FF2B5EF4-FFF2-40B4-BE49-F238E27FC236}">
-                <a16:creationId xmlns:a16="http://schemas.microsoft.com/office/drawing/2014/main" xmlns="" id="{9C8D1E06-1912-43BA-B511-23FF4992DE75}"/>
+                <a16:creationId xmlns="" xmlns:a16="http://schemas.microsoft.com/office/drawing/2014/main" id="{9C8D1E06-1912-43BA-B511-23FF4992DE75}"/>
               </a:ext>
             </a:extLst>
           </p:cNvPr>
@@ -1417,7 +1417,7 @@
           <p:cNvPr id="5" name="Date Placeholder 4">
             <a:extLst>
               <a:ext uri="{FF2B5EF4-FFF2-40B4-BE49-F238E27FC236}">
-                <a16:creationId xmlns:a16="http://schemas.microsoft.com/office/drawing/2014/main" xmlns="" id="{0BD413B7-8899-42AA-AE69-AF3FE368D450}"/>
+                <a16:creationId xmlns="" xmlns:a16="http://schemas.microsoft.com/office/drawing/2014/main" id="{0BD413B7-8899-42AA-AE69-AF3FE368D450}"/>
               </a:ext>
             </a:extLst>
           </p:cNvPr>
@@ -1435,7 +1435,7 @@
           <a:p>
             <a:fld id="{F1EECB64-B6F4-4446-ADE9-F08E6B5CF5C8}" type="datetimeFigureOut">
               <a:rPr lang="en-US" smtClean="0"/>
-              <a:t>1/29/2021</a:t>
+              <a:t>1/30/2021</a:t>
             </a:fld>
             <a:endParaRPr lang="en-US"/>
           </a:p>
@@ -1446,7 +1446,7 @@
           <p:cNvPr id="6" name="Footer Placeholder 5">
             <a:extLst>
               <a:ext uri="{FF2B5EF4-FFF2-40B4-BE49-F238E27FC236}">
-                <a16:creationId xmlns:a16="http://schemas.microsoft.com/office/drawing/2014/main" xmlns="" id="{D3EE098C-D46F-4E5B-8F43-1BEEF5C822EE}"/>
+                <a16:creationId xmlns="" xmlns:a16="http://schemas.microsoft.com/office/drawing/2014/main" id="{D3EE098C-D46F-4E5B-8F43-1BEEF5C822EE}"/>
               </a:ext>
             </a:extLst>
           </p:cNvPr>
@@ -1471,7 +1471,7 @@
           <p:cNvPr id="7" name="Slide Number Placeholder 6">
             <a:extLst>
               <a:ext uri="{FF2B5EF4-FFF2-40B4-BE49-F238E27FC236}">
-                <a16:creationId xmlns:a16="http://schemas.microsoft.com/office/drawing/2014/main" xmlns="" id="{EB3244CA-36F2-4CD9-9041-C37DF8CA12FC}"/>
+                <a16:creationId xmlns="" xmlns:a16="http://schemas.microsoft.com/office/drawing/2014/main" id="{EB3244CA-36F2-4CD9-9041-C37DF8CA12FC}"/>
               </a:ext>
             </a:extLst>
           </p:cNvPr>
@@ -1530,7 +1530,7 @@
           <p:cNvPr id="2" name="Title 1">
             <a:extLst>
               <a:ext uri="{FF2B5EF4-FFF2-40B4-BE49-F238E27FC236}">
-                <a16:creationId xmlns:a16="http://schemas.microsoft.com/office/drawing/2014/main" xmlns="" id="{D9ED3911-D4B4-4657-B7BC-9925246028DB}"/>
+                <a16:creationId xmlns="" xmlns:a16="http://schemas.microsoft.com/office/drawing/2014/main" id="{D9ED3911-D4B4-4657-B7BC-9925246028DB}"/>
               </a:ext>
             </a:extLst>
           </p:cNvPr>
@@ -1563,7 +1563,7 @@
           <p:cNvPr id="3" name="Text Placeholder 2">
             <a:extLst>
               <a:ext uri="{FF2B5EF4-FFF2-40B4-BE49-F238E27FC236}">
-                <a16:creationId xmlns:a16="http://schemas.microsoft.com/office/drawing/2014/main" xmlns="" id="{4B02664A-BE55-4684-86B1-4BDAFAA33590}"/>
+                <a16:creationId xmlns="" xmlns:a16="http://schemas.microsoft.com/office/drawing/2014/main" id="{4B02664A-BE55-4684-86B1-4BDAFAA33590}"/>
               </a:ext>
             </a:extLst>
           </p:cNvPr>
@@ -1634,7 +1634,7 @@
           <p:cNvPr id="4" name="Content Placeholder 3">
             <a:extLst>
               <a:ext uri="{FF2B5EF4-FFF2-40B4-BE49-F238E27FC236}">
-                <a16:creationId xmlns:a16="http://schemas.microsoft.com/office/drawing/2014/main" xmlns="" id="{4B7F1DA5-3132-4485-887D-0759F09CDBAE}"/>
+                <a16:creationId xmlns="" xmlns:a16="http://schemas.microsoft.com/office/drawing/2014/main" id="{4B7F1DA5-3132-4485-887D-0759F09CDBAE}"/>
               </a:ext>
             </a:extLst>
           </p:cNvPr>
@@ -1696,7 +1696,7 @@
           <p:cNvPr id="5" name="Text Placeholder 4">
             <a:extLst>
               <a:ext uri="{FF2B5EF4-FFF2-40B4-BE49-F238E27FC236}">
-                <a16:creationId xmlns:a16="http://schemas.microsoft.com/office/drawing/2014/main" xmlns="" id="{A494FD45-F078-4A65-9877-0FB7FE78B215}"/>
+                <a16:creationId xmlns="" xmlns:a16="http://schemas.microsoft.com/office/drawing/2014/main" id="{A494FD45-F078-4A65-9877-0FB7FE78B215}"/>
               </a:ext>
             </a:extLst>
           </p:cNvPr>
@@ -1767,7 +1767,7 @@
           <p:cNvPr id="6" name="Content Placeholder 5">
             <a:extLst>
               <a:ext uri="{FF2B5EF4-FFF2-40B4-BE49-F238E27FC236}">
-                <a16:creationId xmlns:a16="http://schemas.microsoft.com/office/drawing/2014/main" xmlns="" id="{5EBEF87A-3753-446C-97F7-51E98DEFBD89}"/>
+                <a16:creationId xmlns="" xmlns:a16="http://schemas.microsoft.com/office/drawing/2014/main" id="{5EBEF87A-3753-446C-97F7-51E98DEFBD89}"/>
               </a:ext>
             </a:extLst>
           </p:cNvPr>
@@ -1829,7 +1829,7 @@
           <p:cNvPr id="7" name="Date Placeholder 6">
             <a:extLst>
               <a:ext uri="{FF2B5EF4-FFF2-40B4-BE49-F238E27FC236}">
-                <a16:creationId xmlns:a16="http://schemas.microsoft.com/office/drawing/2014/main" xmlns="" id="{A5F8CD47-0427-42D3-91C0-39C2CC55B4C4}"/>
+                <a16:creationId xmlns="" xmlns:a16="http://schemas.microsoft.com/office/drawing/2014/main" id="{A5F8CD47-0427-42D3-91C0-39C2CC55B4C4}"/>
               </a:ext>
             </a:extLst>
           </p:cNvPr>
@@ -1847,7 +1847,7 @@
           <a:p>
             <a:fld id="{F1EECB64-B6F4-4446-ADE9-F08E6B5CF5C8}" type="datetimeFigureOut">
               <a:rPr lang="en-US" smtClean="0"/>
-              <a:t>1/29/2021</a:t>
+              <a:t>1/30/2021</a:t>
             </a:fld>
             <a:endParaRPr lang="en-US"/>
           </a:p>
@@ -1858,7 +1858,7 @@
           <p:cNvPr id="8" name="Footer Placeholder 7">
             <a:extLst>
               <a:ext uri="{FF2B5EF4-FFF2-40B4-BE49-F238E27FC236}">
-                <a16:creationId xmlns:a16="http://schemas.microsoft.com/office/drawing/2014/main" xmlns="" id="{A2522CD6-B043-40EA-A9F7-C6BF7E309966}"/>
+                <a16:creationId xmlns="" xmlns:a16="http://schemas.microsoft.com/office/drawing/2014/main" id="{A2522CD6-B043-40EA-A9F7-C6BF7E309966}"/>
               </a:ext>
             </a:extLst>
           </p:cNvPr>
@@ -1883,7 +1883,7 @@
           <p:cNvPr id="9" name="Slide Number Placeholder 8">
             <a:extLst>
               <a:ext uri="{FF2B5EF4-FFF2-40B4-BE49-F238E27FC236}">
-                <a16:creationId xmlns:a16="http://schemas.microsoft.com/office/drawing/2014/main" xmlns="" id="{B16EF2BE-7733-435D-8FF5-4D9F0184E19B}"/>
+                <a16:creationId xmlns="" xmlns:a16="http://schemas.microsoft.com/office/drawing/2014/main" id="{B16EF2BE-7733-435D-8FF5-4D9F0184E19B}"/>
               </a:ext>
             </a:extLst>
           </p:cNvPr>
@@ -1942,7 +1942,7 @@
           <p:cNvPr id="2" name="Title 1">
             <a:extLst>
               <a:ext uri="{FF2B5EF4-FFF2-40B4-BE49-F238E27FC236}">
-                <a16:creationId xmlns:a16="http://schemas.microsoft.com/office/drawing/2014/main" xmlns="" id="{873AA08A-9C17-4E51-A437-641CE9ADD7EC}"/>
+                <a16:creationId xmlns="" xmlns:a16="http://schemas.microsoft.com/office/drawing/2014/main" id="{873AA08A-9C17-4E51-A437-641CE9ADD7EC}"/>
               </a:ext>
             </a:extLst>
           </p:cNvPr>
@@ -1970,7 +1970,7 @@
           <p:cNvPr id="3" name="Date Placeholder 2">
             <a:extLst>
               <a:ext uri="{FF2B5EF4-FFF2-40B4-BE49-F238E27FC236}">
-                <a16:creationId xmlns:a16="http://schemas.microsoft.com/office/drawing/2014/main" xmlns="" id="{27AF641F-0E17-494C-A953-07F3F67D1FD9}"/>
+                <a16:creationId xmlns="" xmlns:a16="http://schemas.microsoft.com/office/drawing/2014/main" id="{27AF641F-0E17-494C-A953-07F3F67D1FD9}"/>
               </a:ext>
             </a:extLst>
           </p:cNvPr>
@@ -1988,7 +1988,7 @@
           <a:p>
             <a:fld id="{F1EECB64-B6F4-4446-ADE9-F08E6B5CF5C8}" type="datetimeFigureOut">
               <a:rPr lang="en-US" smtClean="0"/>
-              <a:t>1/29/2021</a:t>
+              <a:t>1/30/2021</a:t>
             </a:fld>
             <a:endParaRPr lang="en-US"/>
           </a:p>
@@ -1999,7 +1999,7 @@
           <p:cNvPr id="4" name="Footer Placeholder 3">
             <a:extLst>
               <a:ext uri="{FF2B5EF4-FFF2-40B4-BE49-F238E27FC236}">
-                <a16:creationId xmlns:a16="http://schemas.microsoft.com/office/drawing/2014/main" xmlns="" id="{EBFCA085-6F02-427F-8A07-1A4ECABC48EE}"/>
+                <a16:creationId xmlns="" xmlns:a16="http://schemas.microsoft.com/office/drawing/2014/main" id="{EBFCA085-6F02-427F-8A07-1A4ECABC48EE}"/>
               </a:ext>
             </a:extLst>
           </p:cNvPr>
@@ -2024,7 +2024,7 @@
           <p:cNvPr id="5" name="Slide Number Placeholder 4">
             <a:extLst>
               <a:ext uri="{FF2B5EF4-FFF2-40B4-BE49-F238E27FC236}">
-                <a16:creationId xmlns:a16="http://schemas.microsoft.com/office/drawing/2014/main" xmlns="" id="{EEEC0304-9880-402B-B841-93F36273D021}"/>
+                <a16:creationId xmlns="" xmlns:a16="http://schemas.microsoft.com/office/drawing/2014/main" id="{EEEC0304-9880-402B-B841-93F36273D021}"/>
               </a:ext>
             </a:extLst>
           </p:cNvPr>
@@ -2083,7 +2083,7 @@
           <p:cNvPr id="2" name="Date Placeholder 1">
             <a:extLst>
               <a:ext uri="{FF2B5EF4-FFF2-40B4-BE49-F238E27FC236}">
-                <a16:creationId xmlns:a16="http://schemas.microsoft.com/office/drawing/2014/main" xmlns="" id="{4A98ABF3-D68A-454A-A535-20A3CE475B8B}"/>
+                <a16:creationId xmlns="" xmlns:a16="http://schemas.microsoft.com/office/drawing/2014/main" id="{4A98ABF3-D68A-454A-A535-20A3CE475B8B}"/>
               </a:ext>
             </a:extLst>
           </p:cNvPr>
@@ -2101,7 +2101,7 @@
           <a:p>
             <a:fld id="{F1EECB64-B6F4-4446-ADE9-F08E6B5CF5C8}" type="datetimeFigureOut">
               <a:rPr lang="en-US" smtClean="0"/>
-              <a:t>1/29/2021</a:t>
+              <a:t>1/30/2021</a:t>
             </a:fld>
             <a:endParaRPr lang="en-US"/>
           </a:p>
@@ -2112,7 +2112,7 @@
           <p:cNvPr id="3" name="Footer Placeholder 2">
             <a:extLst>
               <a:ext uri="{FF2B5EF4-FFF2-40B4-BE49-F238E27FC236}">
-                <a16:creationId xmlns:a16="http://schemas.microsoft.com/office/drawing/2014/main" xmlns="" id="{AD9691FB-DE56-4714-BA75-B7505DDF57CC}"/>
+                <a16:creationId xmlns="" xmlns:a16="http://schemas.microsoft.com/office/drawing/2014/main" id="{AD9691FB-DE56-4714-BA75-B7505DDF57CC}"/>
               </a:ext>
             </a:extLst>
           </p:cNvPr>
@@ -2137,7 +2137,7 @@
           <p:cNvPr id="4" name="Slide Number Placeholder 3">
             <a:extLst>
               <a:ext uri="{FF2B5EF4-FFF2-40B4-BE49-F238E27FC236}">
-                <a16:creationId xmlns:a16="http://schemas.microsoft.com/office/drawing/2014/main" xmlns="" id="{A58FC350-EE6A-4496-8B23-D1CCC247738C}"/>
+                <a16:creationId xmlns="" xmlns:a16="http://schemas.microsoft.com/office/drawing/2014/main" id="{A58FC350-EE6A-4496-8B23-D1CCC247738C}"/>
               </a:ext>
             </a:extLst>
           </p:cNvPr>
@@ -2196,7 +2196,7 @@
           <p:cNvPr id="2" name="Title 1">
             <a:extLst>
               <a:ext uri="{FF2B5EF4-FFF2-40B4-BE49-F238E27FC236}">
-                <a16:creationId xmlns:a16="http://schemas.microsoft.com/office/drawing/2014/main" xmlns="" id="{16F09B3B-BC35-4EAD-AF37-E643B519FD82}"/>
+                <a16:creationId xmlns="" xmlns:a16="http://schemas.microsoft.com/office/drawing/2014/main" id="{16F09B3B-BC35-4EAD-AF37-E643B519FD82}"/>
               </a:ext>
             </a:extLst>
           </p:cNvPr>
@@ -2233,7 +2233,7 @@
           <p:cNvPr id="3" name="Content Placeholder 2">
             <a:extLst>
               <a:ext uri="{FF2B5EF4-FFF2-40B4-BE49-F238E27FC236}">
-                <a16:creationId xmlns:a16="http://schemas.microsoft.com/office/drawing/2014/main" xmlns="" id="{872E6CF9-EEDA-4643-88DA-F618BB02E752}"/>
+                <a16:creationId xmlns="" xmlns:a16="http://schemas.microsoft.com/office/drawing/2014/main" id="{872E6CF9-EEDA-4643-88DA-F618BB02E752}"/>
               </a:ext>
             </a:extLst>
           </p:cNvPr>
@@ -2323,7 +2323,7 @@
           <p:cNvPr id="4" name="Text Placeholder 3">
             <a:extLst>
               <a:ext uri="{FF2B5EF4-FFF2-40B4-BE49-F238E27FC236}">
-                <a16:creationId xmlns:a16="http://schemas.microsoft.com/office/drawing/2014/main" xmlns="" id="{82FCE9CD-21DD-4F35-917D-78D864C61574}"/>
+                <a16:creationId xmlns="" xmlns:a16="http://schemas.microsoft.com/office/drawing/2014/main" id="{82FCE9CD-21DD-4F35-917D-78D864C61574}"/>
               </a:ext>
             </a:extLst>
           </p:cNvPr>
@@ -2394,7 +2394,7 @@
           <p:cNvPr id="5" name="Date Placeholder 4">
             <a:extLst>
               <a:ext uri="{FF2B5EF4-FFF2-40B4-BE49-F238E27FC236}">
-                <a16:creationId xmlns:a16="http://schemas.microsoft.com/office/drawing/2014/main" xmlns="" id="{1E32B34D-DC29-4BCB-B0AD-73596CB413CC}"/>
+                <a16:creationId xmlns="" xmlns:a16="http://schemas.microsoft.com/office/drawing/2014/main" id="{1E32B34D-DC29-4BCB-B0AD-73596CB413CC}"/>
               </a:ext>
             </a:extLst>
           </p:cNvPr>
@@ -2412,7 +2412,7 @@
           <a:p>
             <a:fld id="{F1EECB64-B6F4-4446-ADE9-F08E6B5CF5C8}" type="datetimeFigureOut">
               <a:rPr lang="en-US" smtClean="0"/>
-              <a:t>1/29/2021</a:t>
+              <a:t>1/30/2021</a:t>
             </a:fld>
             <a:endParaRPr lang="en-US"/>
           </a:p>
@@ -2423,7 +2423,7 @@
           <p:cNvPr id="6" name="Footer Placeholder 5">
             <a:extLst>
               <a:ext uri="{FF2B5EF4-FFF2-40B4-BE49-F238E27FC236}">
-                <a16:creationId xmlns:a16="http://schemas.microsoft.com/office/drawing/2014/main" xmlns="" id="{2289A722-65CC-4E1E-9177-DE6EA4ABB7AB}"/>
+                <a16:creationId xmlns="" xmlns:a16="http://schemas.microsoft.com/office/drawing/2014/main" id="{2289A722-65CC-4E1E-9177-DE6EA4ABB7AB}"/>
               </a:ext>
             </a:extLst>
           </p:cNvPr>
@@ -2448,7 +2448,7 @@
           <p:cNvPr id="7" name="Slide Number Placeholder 6">
             <a:extLst>
               <a:ext uri="{FF2B5EF4-FFF2-40B4-BE49-F238E27FC236}">
-                <a16:creationId xmlns:a16="http://schemas.microsoft.com/office/drawing/2014/main" xmlns="" id="{C923A131-2D88-43C2-ADAA-7A1F69E09230}"/>
+                <a16:creationId xmlns="" xmlns:a16="http://schemas.microsoft.com/office/drawing/2014/main" id="{C923A131-2D88-43C2-ADAA-7A1F69E09230}"/>
               </a:ext>
             </a:extLst>
           </p:cNvPr>
@@ -2507,7 +2507,7 @@
           <p:cNvPr id="2" name="Title 1">
             <a:extLst>
               <a:ext uri="{FF2B5EF4-FFF2-40B4-BE49-F238E27FC236}">
-                <a16:creationId xmlns:a16="http://schemas.microsoft.com/office/drawing/2014/main" xmlns="" id="{2469E6FE-D8FE-46DC-81E4-3414D850F996}"/>
+                <a16:creationId xmlns="" xmlns:a16="http://schemas.microsoft.com/office/drawing/2014/main" id="{2469E6FE-D8FE-46DC-81E4-3414D850F996}"/>
               </a:ext>
             </a:extLst>
           </p:cNvPr>
@@ -2544,7 +2544,7 @@
           <p:cNvPr id="3" name="Picture Placeholder 2">
             <a:extLst>
               <a:ext uri="{FF2B5EF4-FFF2-40B4-BE49-F238E27FC236}">
-                <a16:creationId xmlns:a16="http://schemas.microsoft.com/office/drawing/2014/main" xmlns="" id="{1D7A164C-C23D-4CF2-B39C-059A4D6EDC4E}"/>
+                <a16:creationId xmlns="" xmlns:a16="http://schemas.microsoft.com/office/drawing/2014/main" id="{1D7A164C-C23D-4CF2-B39C-059A4D6EDC4E}"/>
               </a:ext>
             </a:extLst>
           </p:cNvPr>
@@ -2611,7 +2611,7 @@
           <p:cNvPr id="4" name="Text Placeholder 3">
             <a:extLst>
               <a:ext uri="{FF2B5EF4-FFF2-40B4-BE49-F238E27FC236}">
-                <a16:creationId xmlns:a16="http://schemas.microsoft.com/office/drawing/2014/main" xmlns="" id="{5A503A94-D7A0-4F5E-9564-964F6D1ADD64}"/>
+                <a16:creationId xmlns="" xmlns:a16="http://schemas.microsoft.com/office/drawing/2014/main" id="{5A503A94-D7A0-4F5E-9564-964F6D1ADD64}"/>
               </a:ext>
             </a:extLst>
           </p:cNvPr>
@@ -2682,7 +2682,7 @@
           <p:cNvPr id="5" name="Date Placeholder 4">
             <a:extLst>
               <a:ext uri="{FF2B5EF4-FFF2-40B4-BE49-F238E27FC236}">
-                <a16:creationId xmlns:a16="http://schemas.microsoft.com/office/drawing/2014/main" xmlns="" id="{D0AA4AFB-8B9D-4EA9-A711-87ACE34283E1}"/>
+                <a16:creationId xmlns="" xmlns:a16="http://schemas.microsoft.com/office/drawing/2014/main" id="{D0AA4AFB-8B9D-4EA9-A711-87ACE34283E1}"/>
               </a:ext>
             </a:extLst>
           </p:cNvPr>
@@ -2700,7 +2700,7 @@
           <a:p>
             <a:fld id="{F1EECB64-B6F4-4446-ADE9-F08E6B5CF5C8}" type="datetimeFigureOut">
               <a:rPr lang="en-US" smtClean="0"/>
-              <a:t>1/29/2021</a:t>
+              <a:t>1/30/2021</a:t>
             </a:fld>
             <a:endParaRPr lang="en-US"/>
           </a:p>
@@ -2711,7 +2711,7 @@
           <p:cNvPr id="6" name="Footer Placeholder 5">
             <a:extLst>
               <a:ext uri="{FF2B5EF4-FFF2-40B4-BE49-F238E27FC236}">
-                <a16:creationId xmlns:a16="http://schemas.microsoft.com/office/drawing/2014/main" xmlns="" id="{E384F9DC-C4F4-44B4-BEB2-6424343421FC}"/>
+                <a16:creationId xmlns="" xmlns:a16="http://schemas.microsoft.com/office/drawing/2014/main" id="{E384F9DC-C4F4-44B4-BEB2-6424343421FC}"/>
               </a:ext>
             </a:extLst>
           </p:cNvPr>
@@ -2736,7 +2736,7 @@
           <p:cNvPr id="7" name="Slide Number Placeholder 6">
             <a:extLst>
               <a:ext uri="{FF2B5EF4-FFF2-40B4-BE49-F238E27FC236}">
-                <a16:creationId xmlns:a16="http://schemas.microsoft.com/office/drawing/2014/main" xmlns="" id="{5BA66C03-396D-48CA-AC21-BA410F894B3E}"/>
+                <a16:creationId xmlns="" xmlns:a16="http://schemas.microsoft.com/office/drawing/2014/main" id="{5BA66C03-396D-48CA-AC21-BA410F894B3E}"/>
               </a:ext>
             </a:extLst>
           </p:cNvPr>
@@ -2800,7 +2800,7 @@
           <p:cNvPr id="2" name="Title Placeholder 1">
             <a:extLst>
               <a:ext uri="{FF2B5EF4-FFF2-40B4-BE49-F238E27FC236}">
-                <a16:creationId xmlns:a16="http://schemas.microsoft.com/office/drawing/2014/main" xmlns="" id="{E97CDC6A-7ED9-4987-853B-578E88DDB978}"/>
+                <a16:creationId xmlns="" xmlns:a16="http://schemas.microsoft.com/office/drawing/2014/main" id="{E97CDC6A-7ED9-4987-853B-578E88DDB978}"/>
               </a:ext>
             </a:extLst>
           </p:cNvPr>
@@ -2838,7 +2838,7 @@
           <p:cNvPr id="3" name="Text Placeholder 2">
             <a:extLst>
               <a:ext uri="{FF2B5EF4-FFF2-40B4-BE49-F238E27FC236}">
-                <a16:creationId xmlns:a16="http://schemas.microsoft.com/office/drawing/2014/main" xmlns="" id="{14EE71EC-72F7-4C3B-A433-4AC5CB7ECD29}"/>
+                <a16:creationId xmlns="" xmlns:a16="http://schemas.microsoft.com/office/drawing/2014/main" id="{14EE71EC-72F7-4C3B-A433-4AC5CB7ECD29}"/>
               </a:ext>
             </a:extLst>
           </p:cNvPr>
@@ -2905,7 +2905,7 @@
           <p:cNvPr id="4" name="Date Placeholder 3">
             <a:extLst>
               <a:ext uri="{FF2B5EF4-FFF2-40B4-BE49-F238E27FC236}">
-                <a16:creationId xmlns:a16="http://schemas.microsoft.com/office/drawing/2014/main" xmlns="" id="{EE0CC44C-A4A5-43DB-AF27-94286197ED50}"/>
+                <a16:creationId xmlns="" xmlns:a16="http://schemas.microsoft.com/office/drawing/2014/main" id="{EE0CC44C-A4A5-43DB-AF27-94286197ED50}"/>
               </a:ext>
             </a:extLst>
           </p:cNvPr>
@@ -2941,7 +2941,7 @@
           <a:p>
             <a:fld id="{F1EECB64-B6F4-4446-ADE9-F08E6B5CF5C8}" type="datetimeFigureOut">
               <a:rPr lang="en-US" smtClean="0"/>
-              <a:t>1/29/2021</a:t>
+              <a:t>1/30/2021</a:t>
             </a:fld>
             <a:endParaRPr lang="en-US"/>
           </a:p>
@@ -2952,7 +2952,7 @@
           <p:cNvPr id="5" name="Footer Placeholder 4">
             <a:extLst>
               <a:ext uri="{FF2B5EF4-FFF2-40B4-BE49-F238E27FC236}">
-                <a16:creationId xmlns:a16="http://schemas.microsoft.com/office/drawing/2014/main" xmlns="" id="{7DBF52AB-237C-44B6-BF91-FA4934C74A89}"/>
+                <a16:creationId xmlns="" xmlns:a16="http://schemas.microsoft.com/office/drawing/2014/main" id="{7DBF52AB-237C-44B6-BF91-FA4934C74A89}"/>
               </a:ext>
             </a:extLst>
           </p:cNvPr>
@@ -2995,7 +2995,7 @@
           <p:cNvPr id="6" name="Slide Number Placeholder 5">
             <a:extLst>
               <a:ext uri="{FF2B5EF4-FFF2-40B4-BE49-F238E27FC236}">
-                <a16:creationId xmlns:a16="http://schemas.microsoft.com/office/drawing/2014/main" xmlns="" id="{824352CD-DFC4-4709-94A0-9BE56D7870C4}"/>
+                <a16:creationId xmlns="" xmlns:a16="http://schemas.microsoft.com/office/drawing/2014/main" id="{824352CD-DFC4-4709-94A0-9BE56D7870C4}"/>
               </a:ext>
             </a:extLst>
           </p:cNvPr>
@@ -3363,7 +3363,7 @@
           <p:cNvPr id="2" name="Title 1">
             <a:extLst>
               <a:ext uri="{FF2B5EF4-FFF2-40B4-BE49-F238E27FC236}">
-                <a16:creationId xmlns:a16="http://schemas.microsoft.com/office/drawing/2014/main" xmlns="" id="{950C2EDD-085F-4B36-9BD4-0BD2CD07ECE5}"/>
+                <a16:creationId xmlns="" xmlns:a16="http://schemas.microsoft.com/office/drawing/2014/main" id="{950C2EDD-085F-4B36-9BD4-0BD2CD07ECE5}"/>
               </a:ext>
             </a:extLst>
           </p:cNvPr>
@@ -3391,7 +3391,7 @@
           <p:cNvPr id="3" name="Subtitle 2">
             <a:extLst>
               <a:ext uri="{FF2B5EF4-FFF2-40B4-BE49-F238E27FC236}">
-                <a16:creationId xmlns:a16="http://schemas.microsoft.com/office/drawing/2014/main" xmlns="" id="{0C4F8B18-0EFA-4FFE-9E3A-AC7175BF7970}"/>
+                <a16:creationId xmlns="" xmlns:a16="http://schemas.microsoft.com/office/drawing/2014/main" id="{0C4F8B18-0EFA-4FFE-9E3A-AC7175BF7970}"/>
               </a:ext>
             </a:extLst>
           </p:cNvPr>
@@ -3456,7 +3456,7 @@
           <p:cNvPr id="2" name="Title 1">
             <a:extLst>
               <a:ext uri="{FF2B5EF4-FFF2-40B4-BE49-F238E27FC236}">
-                <a16:creationId xmlns:a16="http://schemas.microsoft.com/office/drawing/2014/main" xmlns="" id="{228C05EF-903B-428B-9DAE-F7505C58B917}"/>
+                <a16:creationId xmlns="" xmlns:a16="http://schemas.microsoft.com/office/drawing/2014/main" id="{228C05EF-903B-428B-9DAE-F7505C58B917}"/>
               </a:ext>
             </a:extLst>
           </p:cNvPr>
@@ -3489,7 +3489,7 @@
           <p:cNvPr id="19" name="Content Placeholder 18">
             <a:extLst>
               <a:ext uri="{FF2B5EF4-FFF2-40B4-BE49-F238E27FC236}">
-                <a16:creationId xmlns:a16="http://schemas.microsoft.com/office/drawing/2014/main" xmlns="" id="{29D37260-680D-482A-8E5C-014CFEAE1AD7}"/>
+                <a16:creationId xmlns="" xmlns:a16="http://schemas.microsoft.com/office/drawing/2014/main" id="{29D37260-680D-482A-8E5C-014CFEAE1AD7}"/>
               </a:ext>
             </a:extLst>
           </p:cNvPr>
@@ -3519,21 +3519,21 @@
                 <a:gridCol w="2045383">
                   <a:extLst>
                     <a:ext uri="{9D8B030D-6E8A-4147-A177-3AD203B41FA5}">
-                      <a16:colId xmlns:a16="http://schemas.microsoft.com/office/drawing/2014/main" xmlns="" val="489640172"/>
+                      <a16:colId xmlns="" xmlns:a16="http://schemas.microsoft.com/office/drawing/2014/main" val="489640172"/>
                     </a:ext>
                   </a:extLst>
                 </a:gridCol>
                 <a:gridCol w="2228626">
                   <a:extLst>
                     <a:ext uri="{9D8B030D-6E8A-4147-A177-3AD203B41FA5}">
-                      <a16:colId xmlns:a16="http://schemas.microsoft.com/office/drawing/2014/main" xmlns="" val="854573195"/>
+                      <a16:colId xmlns="" xmlns:a16="http://schemas.microsoft.com/office/drawing/2014/main" val="854573195"/>
                     </a:ext>
                   </a:extLst>
                 </a:gridCol>
                 <a:gridCol w="3298366">
                   <a:extLst>
                     <a:ext uri="{9D8B030D-6E8A-4147-A177-3AD203B41FA5}">
-                      <a16:colId xmlns:a16="http://schemas.microsoft.com/office/drawing/2014/main" xmlns="" val="3791285653"/>
+                      <a16:colId xmlns="" xmlns:a16="http://schemas.microsoft.com/office/drawing/2014/main" val="3791285653"/>
                     </a:ext>
                   </a:extLst>
                 </a:gridCol>
@@ -3658,7 +3658,7 @@
                 </a:tc>
                 <a:extLst>
                   <a:ext uri="{0D108BD9-81ED-4DB2-BD59-A6C34878D82A}">
-                    <a16:rowId xmlns:a16="http://schemas.microsoft.com/office/drawing/2014/main" xmlns="" val="3291368365"/>
+                    <a16:rowId xmlns="" xmlns:a16="http://schemas.microsoft.com/office/drawing/2014/main" val="3291368365"/>
                   </a:ext>
                 </a:extLst>
               </a:tr>
@@ -3767,7 +3767,7 @@
                 </a:tc>
                 <a:extLst>
                   <a:ext uri="{0D108BD9-81ED-4DB2-BD59-A6C34878D82A}">
-                    <a16:rowId xmlns:a16="http://schemas.microsoft.com/office/drawing/2014/main" xmlns="" val="1035091340"/>
+                    <a16:rowId xmlns="" xmlns:a16="http://schemas.microsoft.com/office/drawing/2014/main" val="1035091340"/>
                   </a:ext>
                 </a:extLst>
               </a:tr>
@@ -3888,7 +3888,7 @@
                 </a:tc>
                 <a:extLst>
                   <a:ext uri="{0D108BD9-81ED-4DB2-BD59-A6C34878D82A}">
-                    <a16:rowId xmlns:a16="http://schemas.microsoft.com/office/drawing/2014/main" xmlns="" val="1266457433"/>
+                    <a16:rowId xmlns="" xmlns:a16="http://schemas.microsoft.com/office/drawing/2014/main" val="1266457433"/>
                   </a:ext>
                 </a:extLst>
               </a:tr>
@@ -3997,7 +3997,7 @@
                 </a:tc>
                 <a:extLst>
                   <a:ext uri="{0D108BD9-81ED-4DB2-BD59-A6C34878D82A}">
-                    <a16:rowId xmlns:a16="http://schemas.microsoft.com/office/drawing/2014/main" xmlns="" val="257687624"/>
+                    <a16:rowId xmlns="" xmlns:a16="http://schemas.microsoft.com/office/drawing/2014/main" val="257687624"/>
                   </a:ext>
                 </a:extLst>
               </a:tr>
@@ -4118,7 +4118,7 @@
                 </a:tc>
                 <a:extLst>
                   <a:ext uri="{0D108BD9-81ED-4DB2-BD59-A6C34878D82A}">
-                    <a16:rowId xmlns:a16="http://schemas.microsoft.com/office/drawing/2014/main" xmlns="" val="3172583602"/>
+                    <a16:rowId xmlns="" xmlns:a16="http://schemas.microsoft.com/office/drawing/2014/main" val="3172583602"/>
                   </a:ext>
                 </a:extLst>
               </a:tr>
@@ -4131,7 +4131,7 @@
           <p:cNvPr id="21" name="Arrow: Down 20">
             <a:extLst>
               <a:ext uri="{FF2B5EF4-FFF2-40B4-BE49-F238E27FC236}">
-                <a16:creationId xmlns:a16="http://schemas.microsoft.com/office/drawing/2014/main" xmlns="" id="{0F8E3E57-51A5-4B1B-BAC7-1154CF5148CB}"/>
+                <a16:creationId xmlns="" xmlns:a16="http://schemas.microsoft.com/office/drawing/2014/main" id="{0F8E3E57-51A5-4B1B-BAC7-1154CF5148CB}"/>
               </a:ext>
             </a:extLst>
           </p:cNvPr>
@@ -4177,7 +4177,7 @@
           <p:cNvPr id="22" name="Arrow: Down 21">
             <a:extLst>
               <a:ext uri="{FF2B5EF4-FFF2-40B4-BE49-F238E27FC236}">
-                <a16:creationId xmlns:a16="http://schemas.microsoft.com/office/drawing/2014/main" xmlns="" id="{34D23DBF-655A-4926-AFB6-155FE201D9A8}"/>
+                <a16:creationId xmlns="" xmlns:a16="http://schemas.microsoft.com/office/drawing/2014/main" id="{34D23DBF-655A-4926-AFB6-155FE201D9A8}"/>
               </a:ext>
             </a:extLst>
           </p:cNvPr>
@@ -4223,7 +4223,7 @@
           <p:cNvPr id="23" name="Arrow: Down 22">
             <a:extLst>
               <a:ext uri="{FF2B5EF4-FFF2-40B4-BE49-F238E27FC236}">
-                <a16:creationId xmlns:a16="http://schemas.microsoft.com/office/drawing/2014/main" xmlns="" id="{1CDEB5A0-A1F2-44C2-9EB7-337E5B51ACC4}"/>
+                <a16:creationId xmlns="" xmlns:a16="http://schemas.microsoft.com/office/drawing/2014/main" id="{1CDEB5A0-A1F2-44C2-9EB7-337E5B51ACC4}"/>
               </a:ext>
             </a:extLst>
           </p:cNvPr>
@@ -4269,7 +4269,7 @@
           <p:cNvPr id="24" name="TextBox 23">
             <a:extLst>
               <a:ext uri="{FF2B5EF4-FFF2-40B4-BE49-F238E27FC236}">
-                <a16:creationId xmlns:a16="http://schemas.microsoft.com/office/drawing/2014/main" xmlns="" id="{FEA3DAEF-2413-4E2C-9834-9521FD01B307}"/>
+                <a16:creationId xmlns="" xmlns:a16="http://schemas.microsoft.com/office/drawing/2014/main" id="{FEA3DAEF-2413-4E2C-9834-9521FD01B307}"/>
               </a:ext>
             </a:extLst>
           </p:cNvPr>
@@ -4304,7 +4304,7 @@
           <p:cNvPr id="25" name="TextBox 24">
             <a:extLst>
               <a:ext uri="{FF2B5EF4-FFF2-40B4-BE49-F238E27FC236}">
-                <a16:creationId xmlns:a16="http://schemas.microsoft.com/office/drawing/2014/main" xmlns="" id="{50671145-C37D-45C4-9760-F126DC094D78}"/>
+                <a16:creationId xmlns="" xmlns:a16="http://schemas.microsoft.com/office/drawing/2014/main" id="{50671145-C37D-45C4-9760-F126DC094D78}"/>
               </a:ext>
             </a:extLst>
           </p:cNvPr>
@@ -4339,7 +4339,7 @@
           <p:cNvPr id="26" name="TextBox 25">
             <a:extLst>
               <a:ext uri="{FF2B5EF4-FFF2-40B4-BE49-F238E27FC236}">
-                <a16:creationId xmlns:a16="http://schemas.microsoft.com/office/drawing/2014/main" xmlns="" id="{F94DF2C2-5A09-4166-BC47-AC9515BBE17C}"/>
+                <a16:creationId xmlns="" xmlns:a16="http://schemas.microsoft.com/office/drawing/2014/main" id="{F94DF2C2-5A09-4166-BC47-AC9515BBE17C}"/>
               </a:ext>
             </a:extLst>
           </p:cNvPr>
@@ -4374,7 +4374,7 @@
           <p:cNvPr id="3" name="TextBox 2">
             <a:extLst>
               <a:ext uri="{FF2B5EF4-FFF2-40B4-BE49-F238E27FC236}">
-                <a16:creationId xmlns:a16="http://schemas.microsoft.com/office/drawing/2014/main" xmlns="" id="{FFBB87CD-8992-45FE-9382-BCA500FF7381}"/>
+                <a16:creationId xmlns="" xmlns:a16="http://schemas.microsoft.com/office/drawing/2014/main" id="{FFBB87CD-8992-45FE-9382-BCA500FF7381}"/>
               </a:ext>
             </a:extLst>
           </p:cNvPr>
@@ -4420,6 +4420,13 @@
   <p:clrMapOvr>
     <a:masterClrMapping/>
   </p:clrMapOvr>
+  <p:timing>
+    <p:tnLst>
+      <p:par>
+        <p:cTn id="1" dur="indefinite" restart="never" nodeType="tmRoot"/>
+      </p:par>
+    </p:tnLst>
+  </p:timing>
 </p:sld>
 </file>
 
@@ -4445,7 +4452,7 @@
           <p:cNvPr id="2" name="Title 1">
             <a:extLst>
               <a:ext uri="{FF2B5EF4-FFF2-40B4-BE49-F238E27FC236}">
-                <a16:creationId xmlns:a16="http://schemas.microsoft.com/office/drawing/2014/main" xmlns="" id="{3EFC1FFB-8BC4-4CCD-9B2B-282517D39506}"/>
+                <a16:creationId xmlns="" xmlns:a16="http://schemas.microsoft.com/office/drawing/2014/main" id="{3EFC1FFB-8BC4-4CCD-9B2B-282517D39506}"/>
               </a:ext>
             </a:extLst>
           </p:cNvPr>
@@ -4473,7 +4480,7 @@
           <p:cNvPr id="5" name="Rectangle 2">
             <a:extLst>
               <a:ext uri="{FF2B5EF4-FFF2-40B4-BE49-F238E27FC236}">
-                <a16:creationId xmlns:a16="http://schemas.microsoft.com/office/drawing/2014/main" xmlns="" id="{C64C37D3-D9D0-426E-B57D-537FC5677BE1}"/>
+                <a16:creationId xmlns="" xmlns:a16="http://schemas.microsoft.com/office/drawing/2014/main" id="{C64C37D3-D9D0-426E-B57D-537FC5677BE1}"/>
               </a:ext>
             </a:extLst>
           </p:cNvPr>
@@ -5066,7 +5073,7 @@
           <p:cNvPr id="6" name="Arrow: Right 5">
             <a:extLst>
               <a:ext uri="{FF2B5EF4-FFF2-40B4-BE49-F238E27FC236}">
-                <a16:creationId xmlns:a16="http://schemas.microsoft.com/office/drawing/2014/main" xmlns="" id="{E86945C2-27A3-43C9-8ED4-435168044437}"/>
+                <a16:creationId xmlns="" xmlns:a16="http://schemas.microsoft.com/office/drawing/2014/main" id="{E86945C2-27A3-43C9-8ED4-435168044437}"/>
               </a:ext>
             </a:extLst>
           </p:cNvPr>
@@ -5112,7 +5119,7 @@
           <p:cNvPr id="8" name="Rectangle 7">
             <a:extLst>
               <a:ext uri="{FF2B5EF4-FFF2-40B4-BE49-F238E27FC236}">
-                <a16:creationId xmlns:a16="http://schemas.microsoft.com/office/drawing/2014/main" xmlns="" id="{320B246F-8FC9-400F-B402-1F0393281007}"/>
+                <a16:creationId xmlns="" xmlns:a16="http://schemas.microsoft.com/office/drawing/2014/main" id="{320B246F-8FC9-400F-B402-1F0393281007}"/>
               </a:ext>
             </a:extLst>
           </p:cNvPr>
@@ -5270,7 +5277,7 @@
           <p:cNvPr id="9" name="TextBox 8">
             <a:extLst>
               <a:ext uri="{FF2B5EF4-FFF2-40B4-BE49-F238E27FC236}">
-                <a16:creationId xmlns:a16="http://schemas.microsoft.com/office/drawing/2014/main" xmlns="" id="{B3EB77AA-AD87-492A-B407-1E364639AA36}"/>
+                <a16:creationId xmlns="" xmlns:a16="http://schemas.microsoft.com/office/drawing/2014/main" id="{B3EB77AA-AD87-492A-B407-1E364639AA36}"/>
               </a:ext>
             </a:extLst>
           </p:cNvPr>
@@ -5305,7 +5312,7 @@
           <p:cNvPr id="10" name="TextBox 9">
             <a:extLst>
               <a:ext uri="{FF2B5EF4-FFF2-40B4-BE49-F238E27FC236}">
-                <a16:creationId xmlns:a16="http://schemas.microsoft.com/office/drawing/2014/main" xmlns="" id="{1C9A19C9-55C9-456B-8211-A9F9D60C4B72}"/>
+                <a16:creationId xmlns="" xmlns:a16="http://schemas.microsoft.com/office/drawing/2014/main" id="{1C9A19C9-55C9-456B-8211-A9F9D60C4B72}"/>
               </a:ext>
             </a:extLst>
           </p:cNvPr>
@@ -5345,6 +5352,13 @@
   <p:clrMapOvr>
     <a:masterClrMapping/>
   </p:clrMapOvr>
+  <p:timing>
+    <p:tnLst>
+      <p:par>
+        <p:cTn id="1" dur="indefinite" restart="never" nodeType="tmRoot"/>
+      </p:par>
+    </p:tnLst>
+  </p:timing>
 </p:sld>
 </file>
 
@@ -5370,7 +5384,7 @@
           <p:cNvPr id="2" name="Title 1">
             <a:extLst>
               <a:ext uri="{FF2B5EF4-FFF2-40B4-BE49-F238E27FC236}">
-                <a16:creationId xmlns:a16="http://schemas.microsoft.com/office/drawing/2014/main" xmlns="" id="{3EFC1FFB-8BC4-4CCD-9B2B-282517D39506}"/>
+                <a16:creationId xmlns="" xmlns:a16="http://schemas.microsoft.com/office/drawing/2014/main" id="{3EFC1FFB-8BC4-4CCD-9B2B-282517D39506}"/>
               </a:ext>
             </a:extLst>
           </p:cNvPr>
@@ -5398,7 +5412,7 @@
           <p:cNvPr id="13314" name="Picture 2" descr="SQL Server 2016: Create a Table">
             <a:extLst>
               <a:ext uri="{FF2B5EF4-FFF2-40B4-BE49-F238E27FC236}">
-                <a16:creationId xmlns:a16="http://schemas.microsoft.com/office/drawing/2014/main" xmlns="" id="{A3439354-DD86-4AA7-922D-47BD29DB8691}"/>
+                <a16:creationId xmlns="" xmlns:a16="http://schemas.microsoft.com/office/drawing/2014/main" id="{A3439354-DD86-4AA7-922D-47BD29DB8691}"/>
               </a:ext>
             </a:extLst>
           </p:cNvPr>
@@ -5452,6 +5466,13 @@
   <p:clrMapOvr>
     <a:masterClrMapping/>
   </p:clrMapOvr>
+  <p:timing>
+    <p:tnLst>
+      <p:par>
+        <p:cTn id="1" dur="indefinite" restart="never" nodeType="tmRoot"/>
+      </p:par>
+    </p:tnLst>
+  </p:timing>
 </p:sld>
 </file>
 
@@ -5477,7 +5498,7 @@
           <p:cNvPr id="2" name="Title 1">
             <a:extLst>
               <a:ext uri="{FF2B5EF4-FFF2-40B4-BE49-F238E27FC236}">
-                <a16:creationId xmlns:a16="http://schemas.microsoft.com/office/drawing/2014/main" xmlns="" id="{607DD11F-F8AA-4F5B-9EFB-76EA71F285B8}"/>
+                <a16:creationId xmlns="" xmlns:a16="http://schemas.microsoft.com/office/drawing/2014/main" id="{607DD11F-F8AA-4F5B-9EFB-76EA71F285B8}"/>
               </a:ext>
             </a:extLst>
           </p:cNvPr>
@@ -5505,7 +5526,7 @@
           <p:cNvPr id="4" name="Rectangle 1">
             <a:extLst>
               <a:ext uri="{FF2B5EF4-FFF2-40B4-BE49-F238E27FC236}">
-                <a16:creationId xmlns:a16="http://schemas.microsoft.com/office/drawing/2014/main" xmlns="" id="{35843942-6450-40C3-B7FA-4B801C9AB2D6}"/>
+                <a16:creationId xmlns="" xmlns:a16="http://schemas.microsoft.com/office/drawing/2014/main" id="{35843942-6450-40C3-B7FA-4B801C9AB2D6}"/>
               </a:ext>
             </a:extLst>
           </p:cNvPr>
@@ -6026,6 +6047,13 @@
   <p:clrMapOvr>
     <a:masterClrMapping/>
   </p:clrMapOvr>
+  <p:timing>
+    <p:tnLst>
+      <p:par>
+        <p:cTn id="1" dur="indefinite" restart="never" nodeType="tmRoot"/>
+      </p:par>
+    </p:tnLst>
+  </p:timing>
 </p:sld>
 </file>
 
@@ -6051,7 +6079,7 @@
           <p:cNvPr id="2" name="Title 1">
             <a:extLst>
               <a:ext uri="{FF2B5EF4-FFF2-40B4-BE49-F238E27FC236}">
-                <a16:creationId xmlns:a16="http://schemas.microsoft.com/office/drawing/2014/main" xmlns="" id="{1CBD17FD-1BE9-4942-8717-F884D816068B}"/>
+                <a16:creationId xmlns="" xmlns:a16="http://schemas.microsoft.com/office/drawing/2014/main" id="{1CBD17FD-1BE9-4942-8717-F884D816068B}"/>
               </a:ext>
             </a:extLst>
           </p:cNvPr>
@@ -6079,7 +6107,7 @@
           <p:cNvPr id="15362" name="Picture 2" descr="Sql Server Delete Table - javatpoint">
             <a:extLst>
               <a:ext uri="{FF2B5EF4-FFF2-40B4-BE49-F238E27FC236}">
-                <a16:creationId xmlns:a16="http://schemas.microsoft.com/office/drawing/2014/main" xmlns="" id="{7D01615E-74DB-4632-A75E-9A712141B569}"/>
+                <a16:creationId xmlns="" xmlns:a16="http://schemas.microsoft.com/office/drawing/2014/main" id="{7D01615E-74DB-4632-A75E-9A712141B569}"/>
               </a:ext>
             </a:extLst>
           </p:cNvPr>
@@ -6133,6 +6161,13 @@
   <p:clrMapOvr>
     <a:masterClrMapping/>
   </p:clrMapOvr>
+  <p:timing>
+    <p:tnLst>
+      <p:par>
+        <p:cTn id="1" dur="indefinite" restart="never" nodeType="tmRoot"/>
+      </p:par>
+    </p:tnLst>
+  </p:timing>
 </p:sld>
 </file>
 
@@ -6158,7 +6193,7 @@
           <p:cNvPr id="2" name="Title 1">
             <a:extLst>
               <a:ext uri="{FF2B5EF4-FFF2-40B4-BE49-F238E27FC236}">
-                <a16:creationId xmlns:a16="http://schemas.microsoft.com/office/drawing/2014/main" xmlns="" id="{B467B98C-DE58-41FB-92FB-B60D980B49BA}"/>
+                <a16:creationId xmlns="" xmlns:a16="http://schemas.microsoft.com/office/drawing/2014/main" id="{B467B98C-DE58-41FB-92FB-B60D980B49BA}"/>
               </a:ext>
             </a:extLst>
           </p:cNvPr>
@@ -6186,7 +6221,7 @@
           <p:cNvPr id="3" name="Content Placeholder 2">
             <a:extLst>
               <a:ext uri="{FF2B5EF4-FFF2-40B4-BE49-F238E27FC236}">
-                <a16:creationId xmlns:a16="http://schemas.microsoft.com/office/drawing/2014/main" xmlns="" id="{45FB80EF-78F9-4B6E-B64D-5096D07D6C60}"/>
+                <a16:creationId xmlns="" xmlns:a16="http://schemas.microsoft.com/office/drawing/2014/main" id="{45FB80EF-78F9-4B6E-B64D-5096D07D6C60}"/>
               </a:ext>
             </a:extLst>
           </p:cNvPr>
@@ -6343,6 +6378,13 @@
   <p:clrMapOvr>
     <a:masterClrMapping/>
   </p:clrMapOvr>
+  <p:timing>
+    <p:tnLst>
+      <p:par>
+        <p:cTn id="1" dur="indefinite" restart="never" nodeType="tmRoot"/>
+      </p:par>
+    </p:tnLst>
+  </p:timing>
 </p:sld>
 </file>
 
@@ -6368,7 +6410,7 @@
           <p:cNvPr id="2" name="Title 1">
             <a:extLst>
               <a:ext uri="{FF2B5EF4-FFF2-40B4-BE49-F238E27FC236}">
-                <a16:creationId xmlns:a16="http://schemas.microsoft.com/office/drawing/2014/main" xmlns="" id="{BE7BCB06-18FA-44E8-96C5-5FC0F215F34A}"/>
+                <a16:creationId xmlns="" xmlns:a16="http://schemas.microsoft.com/office/drawing/2014/main" id="{BE7BCB06-18FA-44E8-96C5-5FC0F215F34A}"/>
               </a:ext>
             </a:extLst>
           </p:cNvPr>
@@ -6396,7 +6438,7 @@
           <p:cNvPr id="3" name="Content Placeholder 2">
             <a:extLst>
               <a:ext uri="{FF2B5EF4-FFF2-40B4-BE49-F238E27FC236}">
-                <a16:creationId xmlns:a16="http://schemas.microsoft.com/office/drawing/2014/main" xmlns="" id="{BEF31044-CC78-49DD-9537-2CAEA7DA611B}"/>
+                <a16:creationId xmlns="" xmlns:a16="http://schemas.microsoft.com/office/drawing/2014/main" id="{BEF31044-CC78-49DD-9537-2CAEA7DA611B}"/>
               </a:ext>
             </a:extLst>
           </p:cNvPr>
@@ -6512,7 +6554,7 @@
           <p:cNvPr id="4" name="Arrow: Right 3">
             <a:extLst>
               <a:ext uri="{FF2B5EF4-FFF2-40B4-BE49-F238E27FC236}">
-                <a16:creationId xmlns:a16="http://schemas.microsoft.com/office/drawing/2014/main" xmlns="" id="{6EA9B56B-9850-4C07-B115-01B8E50729EE}"/>
+                <a16:creationId xmlns="" xmlns:a16="http://schemas.microsoft.com/office/drawing/2014/main" id="{6EA9B56B-9850-4C07-B115-01B8E50729EE}"/>
               </a:ext>
             </a:extLst>
           </p:cNvPr>
@@ -6563,6 +6605,13 @@
   <p:clrMapOvr>
     <a:masterClrMapping/>
   </p:clrMapOvr>
+  <p:timing>
+    <p:tnLst>
+      <p:par>
+        <p:cTn id="1" dur="indefinite" restart="never" nodeType="tmRoot"/>
+      </p:par>
+    </p:tnLst>
+  </p:timing>
 </p:sld>
 </file>
 
@@ -6588,7 +6637,7 @@
           <p:cNvPr id="2" name="Title 1">
             <a:extLst>
               <a:ext uri="{FF2B5EF4-FFF2-40B4-BE49-F238E27FC236}">
-                <a16:creationId xmlns:a16="http://schemas.microsoft.com/office/drawing/2014/main" xmlns="" id="{FE5702D3-3775-492B-B7B2-4345415E916E}"/>
+                <a16:creationId xmlns="" xmlns:a16="http://schemas.microsoft.com/office/drawing/2014/main" id="{FE5702D3-3775-492B-B7B2-4345415E916E}"/>
               </a:ext>
             </a:extLst>
           </p:cNvPr>
@@ -6616,7 +6665,7 @@
           <p:cNvPr id="3" name="Content Placeholder 2">
             <a:extLst>
               <a:ext uri="{FF2B5EF4-FFF2-40B4-BE49-F238E27FC236}">
-                <a16:creationId xmlns:a16="http://schemas.microsoft.com/office/drawing/2014/main" xmlns="" id="{B7C56BC4-EAC4-494E-9714-A374025BE850}"/>
+                <a16:creationId xmlns="" xmlns:a16="http://schemas.microsoft.com/office/drawing/2014/main" id="{B7C56BC4-EAC4-494E-9714-A374025BE850}"/>
               </a:ext>
             </a:extLst>
           </p:cNvPr>
@@ -6705,6 +6754,13 @@
   <p:clrMapOvr>
     <a:masterClrMapping/>
   </p:clrMapOvr>
+  <p:timing>
+    <p:tnLst>
+      <p:par>
+        <p:cTn id="1" dur="indefinite" restart="never" nodeType="tmRoot"/>
+      </p:par>
+    </p:tnLst>
+  </p:timing>
 </p:sld>
 </file>
 
@@ -6730,7 +6786,7 @@
           <p:cNvPr id="2" name="Title 1">
             <a:extLst>
               <a:ext uri="{FF2B5EF4-FFF2-40B4-BE49-F238E27FC236}">
-                <a16:creationId xmlns:a16="http://schemas.microsoft.com/office/drawing/2014/main" xmlns="" id="{256AB3C6-DE9D-42AC-9472-5991D915C37B}"/>
+                <a16:creationId xmlns="" xmlns:a16="http://schemas.microsoft.com/office/drawing/2014/main" id="{256AB3C6-DE9D-42AC-9472-5991D915C37B}"/>
               </a:ext>
             </a:extLst>
           </p:cNvPr>
@@ -6758,7 +6814,7 @@
           <p:cNvPr id="3" name="Content Placeholder 2">
             <a:extLst>
               <a:ext uri="{FF2B5EF4-FFF2-40B4-BE49-F238E27FC236}">
-                <a16:creationId xmlns:a16="http://schemas.microsoft.com/office/drawing/2014/main" xmlns="" id="{AE0C5C37-2CA3-4157-B83E-1D4D4A41AF24}"/>
+                <a16:creationId xmlns="" xmlns:a16="http://schemas.microsoft.com/office/drawing/2014/main" id="{AE0C5C37-2CA3-4157-B83E-1D4D4A41AF24}"/>
               </a:ext>
             </a:extLst>
           </p:cNvPr>
@@ -6796,8 +6852,13 @@
           <a:p>
             <a:r>
               <a:rPr lang="en-US" dirty="0"/>
-              <a:t>Make sure to add following rows:</a:t>
-            </a:r>
+              <a:t>Make sure to add following </a:t>
+            </a:r>
+            <a:r>
+              <a:rPr lang="en-US" dirty="0" smtClean="0"/>
+              <a:t>columns:</a:t>
+            </a:r>
+            <a:endParaRPr lang="en-US" dirty="0"/>
           </a:p>
           <a:p>
             <a:pPr lvl="1"/>
@@ -6847,7 +6908,7 @@
           <p:cNvPr id="5" name="Table 4">
             <a:extLst>
               <a:ext uri="{FF2B5EF4-FFF2-40B4-BE49-F238E27FC236}">
-                <a16:creationId xmlns:a16="http://schemas.microsoft.com/office/drawing/2014/main" xmlns="" id="{93E49032-507A-40D4-85EF-59C647A5EE59}"/>
+                <a16:creationId xmlns="" xmlns:a16="http://schemas.microsoft.com/office/drawing/2014/main" id="{93E49032-507A-40D4-85EF-59C647A5EE59}"/>
               </a:ext>
             </a:extLst>
           </p:cNvPr>
@@ -6874,21 +6935,21 @@
                 <a:gridCol w="2030959">
                   <a:extLst>
                     <a:ext uri="{9D8B030D-6E8A-4147-A177-3AD203B41FA5}">
-                      <a16:colId xmlns:a16="http://schemas.microsoft.com/office/drawing/2014/main" xmlns="" val="3964053262"/>
+                      <a16:colId xmlns="" xmlns:a16="http://schemas.microsoft.com/office/drawing/2014/main" val="3964053262"/>
                     </a:ext>
                   </a:extLst>
                 </a:gridCol>
                 <a:gridCol w="2030959">
                   <a:extLst>
                     <a:ext uri="{9D8B030D-6E8A-4147-A177-3AD203B41FA5}">
-                      <a16:colId xmlns:a16="http://schemas.microsoft.com/office/drawing/2014/main" xmlns="" val="2393142111"/>
+                      <a16:colId xmlns="" xmlns:a16="http://schemas.microsoft.com/office/drawing/2014/main" val="2393142111"/>
                     </a:ext>
                   </a:extLst>
                 </a:gridCol>
                 <a:gridCol w="2030959">
                   <a:extLst>
                     <a:ext uri="{9D8B030D-6E8A-4147-A177-3AD203B41FA5}">
-                      <a16:colId xmlns:a16="http://schemas.microsoft.com/office/drawing/2014/main" xmlns="" val="959749687"/>
+                      <a16:colId xmlns="" xmlns:a16="http://schemas.microsoft.com/office/drawing/2014/main" val="959749687"/>
                     </a:ext>
                   </a:extLst>
                 </a:gridCol>
@@ -6986,7 +7047,7 @@
                 </a:tc>
                 <a:extLst>
                   <a:ext uri="{0D108BD9-81ED-4DB2-BD59-A6C34878D82A}">
-                    <a16:rowId xmlns:a16="http://schemas.microsoft.com/office/drawing/2014/main" xmlns="" val="1641022578"/>
+                    <a16:rowId xmlns="" xmlns:a16="http://schemas.microsoft.com/office/drawing/2014/main" val="1641022578"/>
                   </a:ext>
                 </a:extLst>
               </a:tr>
@@ -7080,7 +7141,7 @@
                 </a:tc>
                 <a:extLst>
                   <a:ext uri="{0D108BD9-81ED-4DB2-BD59-A6C34878D82A}">
-                    <a16:rowId xmlns:a16="http://schemas.microsoft.com/office/drawing/2014/main" xmlns="" val="2571851787"/>
+                    <a16:rowId xmlns="" xmlns:a16="http://schemas.microsoft.com/office/drawing/2014/main" val="2571851787"/>
                   </a:ext>
                 </a:extLst>
               </a:tr>
@@ -7098,6 +7159,13 @@
   <p:clrMapOvr>
     <a:masterClrMapping/>
   </p:clrMapOvr>
+  <p:timing>
+    <p:tnLst>
+      <p:par>
+        <p:cTn id="1" dur="indefinite" restart="never" nodeType="tmRoot"/>
+      </p:par>
+    </p:tnLst>
+  </p:timing>
 </p:sld>
 </file>
 
@@ -7123,7 +7191,7 @@
           <p:cNvPr id="2" name="Title 1">
             <a:extLst>
               <a:ext uri="{FF2B5EF4-FFF2-40B4-BE49-F238E27FC236}">
-                <a16:creationId xmlns:a16="http://schemas.microsoft.com/office/drawing/2014/main" xmlns="" id="{F9F6E8E1-FC24-458D-9C4B-A5F3B9137B45}"/>
+                <a16:creationId xmlns="" xmlns:a16="http://schemas.microsoft.com/office/drawing/2014/main" id="{F9F6E8E1-FC24-458D-9C4B-A5F3B9137B45}"/>
               </a:ext>
             </a:extLst>
           </p:cNvPr>
@@ -7151,7 +7219,7 @@
           <p:cNvPr id="3" name="Content Placeholder 2">
             <a:extLst>
               <a:ext uri="{FF2B5EF4-FFF2-40B4-BE49-F238E27FC236}">
-                <a16:creationId xmlns:a16="http://schemas.microsoft.com/office/drawing/2014/main" xmlns="" id="{02CCB961-7471-4BAF-AA57-FC8BE13EB1E6}"/>
+                <a16:creationId xmlns="" xmlns:a16="http://schemas.microsoft.com/office/drawing/2014/main" id="{02CCB961-7471-4BAF-AA57-FC8BE13EB1E6}"/>
               </a:ext>
             </a:extLst>
           </p:cNvPr>
@@ -7200,7 +7268,7 @@
           <p:cNvPr id="4" name="Table 3">
             <a:extLst>
               <a:ext uri="{FF2B5EF4-FFF2-40B4-BE49-F238E27FC236}">
-                <a16:creationId xmlns:a16="http://schemas.microsoft.com/office/drawing/2014/main" xmlns="" id="{40FE412C-2E96-4162-8CAE-370736E0BC02}"/>
+                <a16:creationId xmlns="" xmlns:a16="http://schemas.microsoft.com/office/drawing/2014/main" id="{40FE412C-2E96-4162-8CAE-370736E0BC02}"/>
               </a:ext>
             </a:extLst>
           </p:cNvPr>
@@ -7227,21 +7295,21 @@
                 <a:gridCol w="2030959">
                   <a:extLst>
                     <a:ext uri="{9D8B030D-6E8A-4147-A177-3AD203B41FA5}">
-                      <a16:colId xmlns:a16="http://schemas.microsoft.com/office/drawing/2014/main" xmlns="" val="3647487068"/>
+                      <a16:colId xmlns="" xmlns:a16="http://schemas.microsoft.com/office/drawing/2014/main" val="3647487068"/>
                     </a:ext>
                   </a:extLst>
                 </a:gridCol>
                 <a:gridCol w="2030959">
                   <a:extLst>
                     <a:ext uri="{9D8B030D-6E8A-4147-A177-3AD203B41FA5}">
-                      <a16:colId xmlns:a16="http://schemas.microsoft.com/office/drawing/2014/main" xmlns="" val="4032819035"/>
+                      <a16:colId xmlns="" xmlns:a16="http://schemas.microsoft.com/office/drawing/2014/main" val="4032819035"/>
                     </a:ext>
                   </a:extLst>
                 </a:gridCol>
                 <a:gridCol w="2030959">
                   <a:extLst>
                     <a:ext uri="{9D8B030D-6E8A-4147-A177-3AD203B41FA5}">
-                      <a16:colId xmlns:a16="http://schemas.microsoft.com/office/drawing/2014/main" xmlns="" val="663302552"/>
+                      <a16:colId xmlns="" xmlns:a16="http://schemas.microsoft.com/office/drawing/2014/main" val="663302552"/>
                     </a:ext>
                   </a:extLst>
                 </a:gridCol>
@@ -7347,7 +7415,7 @@
                 </a:tc>
                 <a:extLst>
                   <a:ext uri="{0D108BD9-81ED-4DB2-BD59-A6C34878D82A}">
-                    <a16:rowId xmlns:a16="http://schemas.microsoft.com/office/drawing/2014/main" xmlns="" val="226649884"/>
+                    <a16:rowId xmlns="" xmlns:a16="http://schemas.microsoft.com/office/drawing/2014/main" val="226649884"/>
                   </a:ext>
                 </a:extLst>
               </a:tr>
@@ -7441,7 +7509,7 @@
                 </a:tc>
                 <a:extLst>
                   <a:ext uri="{0D108BD9-81ED-4DB2-BD59-A6C34878D82A}">
-                    <a16:rowId xmlns:a16="http://schemas.microsoft.com/office/drawing/2014/main" xmlns="" val="1176920186"/>
+                    <a16:rowId xmlns="" xmlns:a16="http://schemas.microsoft.com/office/drawing/2014/main" val="1176920186"/>
                   </a:ext>
                 </a:extLst>
               </a:tr>
@@ -7454,7 +7522,7 @@
           <p:cNvPr id="5" name="Table 4">
             <a:extLst>
               <a:ext uri="{FF2B5EF4-FFF2-40B4-BE49-F238E27FC236}">
-                <a16:creationId xmlns:a16="http://schemas.microsoft.com/office/drawing/2014/main" xmlns="" id="{7794471B-ED3C-40C1-94B1-8DCF6E3E641C}"/>
+                <a16:creationId xmlns="" xmlns:a16="http://schemas.microsoft.com/office/drawing/2014/main" id="{7794471B-ED3C-40C1-94B1-8DCF6E3E641C}"/>
               </a:ext>
             </a:extLst>
           </p:cNvPr>
@@ -7481,21 +7549,21 @@
                 <a:gridCol w="2030959">
                   <a:extLst>
                     <a:ext uri="{9D8B030D-6E8A-4147-A177-3AD203B41FA5}">
-                      <a16:colId xmlns:a16="http://schemas.microsoft.com/office/drawing/2014/main" xmlns="" val="621490805"/>
+                      <a16:colId xmlns="" xmlns:a16="http://schemas.microsoft.com/office/drawing/2014/main" val="621490805"/>
                     </a:ext>
                   </a:extLst>
                 </a:gridCol>
                 <a:gridCol w="2030959">
                   <a:extLst>
                     <a:ext uri="{9D8B030D-6E8A-4147-A177-3AD203B41FA5}">
-                      <a16:colId xmlns:a16="http://schemas.microsoft.com/office/drawing/2014/main" xmlns="" val="1808497515"/>
+                      <a16:colId xmlns="" xmlns:a16="http://schemas.microsoft.com/office/drawing/2014/main" val="1808497515"/>
                     </a:ext>
                   </a:extLst>
                 </a:gridCol>
                 <a:gridCol w="2030959">
                   <a:extLst>
                     <a:ext uri="{9D8B030D-6E8A-4147-A177-3AD203B41FA5}">
-                      <a16:colId xmlns:a16="http://schemas.microsoft.com/office/drawing/2014/main" xmlns="" val="3662728702"/>
+                      <a16:colId xmlns="" xmlns:a16="http://schemas.microsoft.com/office/drawing/2014/main" val="3662728702"/>
                     </a:ext>
                   </a:extLst>
                 </a:gridCol>
@@ -7593,7 +7661,7 @@
                 </a:tc>
                 <a:extLst>
                   <a:ext uri="{0D108BD9-81ED-4DB2-BD59-A6C34878D82A}">
-                    <a16:rowId xmlns:a16="http://schemas.microsoft.com/office/drawing/2014/main" xmlns="" val="2802106988"/>
+                    <a16:rowId xmlns="" xmlns:a16="http://schemas.microsoft.com/office/drawing/2014/main" val="2802106988"/>
                   </a:ext>
                 </a:extLst>
               </a:tr>
@@ -7687,7 +7755,7 @@
                 </a:tc>
                 <a:extLst>
                   <a:ext uri="{0D108BD9-81ED-4DB2-BD59-A6C34878D82A}">
-                    <a16:rowId xmlns:a16="http://schemas.microsoft.com/office/drawing/2014/main" xmlns="" val="3119733108"/>
+                    <a16:rowId xmlns="" xmlns:a16="http://schemas.microsoft.com/office/drawing/2014/main" val="3119733108"/>
                   </a:ext>
                 </a:extLst>
               </a:tr>
@@ -7781,7 +7849,7 @@
                 </a:tc>
                 <a:extLst>
                   <a:ext uri="{0D108BD9-81ED-4DB2-BD59-A6C34878D82A}">
-                    <a16:rowId xmlns:a16="http://schemas.microsoft.com/office/drawing/2014/main" xmlns="" val="3469363309"/>
+                    <a16:rowId xmlns="" xmlns:a16="http://schemas.microsoft.com/office/drawing/2014/main" val="3469363309"/>
                   </a:ext>
                 </a:extLst>
               </a:tr>
@@ -7875,7 +7943,7 @@
                 </a:tc>
                 <a:extLst>
                   <a:ext uri="{0D108BD9-81ED-4DB2-BD59-A6C34878D82A}">
-                    <a16:rowId xmlns:a16="http://schemas.microsoft.com/office/drawing/2014/main" xmlns="" val="2482138033"/>
+                    <a16:rowId xmlns="" xmlns:a16="http://schemas.microsoft.com/office/drawing/2014/main" val="2482138033"/>
                   </a:ext>
                 </a:extLst>
               </a:tr>
@@ -7893,6 +7961,13 @@
   <p:clrMapOvr>
     <a:masterClrMapping/>
   </p:clrMapOvr>
+  <p:timing>
+    <p:tnLst>
+      <p:par>
+        <p:cTn id="1" dur="indefinite" restart="never" nodeType="tmRoot"/>
+      </p:par>
+    </p:tnLst>
+  </p:timing>
 </p:sld>
 </file>
 
@@ -7918,7 +7993,7 @@
           <p:cNvPr id="2" name="Title 1">
             <a:extLst>
               <a:ext uri="{FF2B5EF4-FFF2-40B4-BE49-F238E27FC236}">
-                <a16:creationId xmlns:a16="http://schemas.microsoft.com/office/drawing/2014/main" xmlns="" id="{D7410047-1D16-4A18-BFB7-AB0560F31EE8}"/>
+                <a16:creationId xmlns="" xmlns:a16="http://schemas.microsoft.com/office/drawing/2014/main" id="{D7410047-1D16-4A18-BFB7-AB0560F31EE8}"/>
               </a:ext>
             </a:extLst>
           </p:cNvPr>
@@ -7947,7 +8022,7 @@
           <p:cNvPr id="3" name="Content Placeholder 2">
             <a:extLst>
               <a:ext uri="{FF2B5EF4-FFF2-40B4-BE49-F238E27FC236}">
-                <a16:creationId xmlns:a16="http://schemas.microsoft.com/office/drawing/2014/main" xmlns="" id="{B7C0316D-65BA-4B36-ADE0-438B960E7862}"/>
+                <a16:creationId xmlns="" xmlns:a16="http://schemas.microsoft.com/office/drawing/2014/main" id="{B7C0316D-65BA-4B36-ADE0-438B960E7862}"/>
               </a:ext>
             </a:extLst>
           </p:cNvPr>
@@ -7984,7 +8059,7 @@
           <p:cNvPr id="19460" name="Picture 4" descr="Database Architecture — Using One Database Schema per Customer | by  Vladimir Zulin | Pipedrive Engineering | Medium">
             <a:extLst>
               <a:ext uri="{FF2B5EF4-FFF2-40B4-BE49-F238E27FC236}">
-                <a16:creationId xmlns:a16="http://schemas.microsoft.com/office/drawing/2014/main" xmlns="" id="{5BB15A31-B0B3-41BA-B3B8-0524AA54699F}"/>
+                <a16:creationId xmlns="" xmlns:a16="http://schemas.microsoft.com/office/drawing/2014/main" id="{5BB15A31-B0B3-41BA-B3B8-0524AA54699F}"/>
               </a:ext>
             </a:extLst>
           </p:cNvPr>
@@ -8031,7 +8106,7 @@
           <p:cNvPr id="5" name="Picture 4">
             <a:extLst>
               <a:ext uri="{FF2B5EF4-FFF2-40B4-BE49-F238E27FC236}">
-                <a16:creationId xmlns:a16="http://schemas.microsoft.com/office/drawing/2014/main" xmlns="" id="{BF3FC9AB-80F4-4829-BDD3-E6F4B91E0828}"/>
+                <a16:creationId xmlns="" xmlns:a16="http://schemas.microsoft.com/office/drawing/2014/main" id="{BF3FC9AB-80F4-4829-BDD3-E6F4B91E0828}"/>
               </a:ext>
             </a:extLst>
           </p:cNvPr>
@@ -8098,7 +8173,7 @@
           <p:cNvPr id="2" name="Title 1">
             <a:extLst>
               <a:ext uri="{FF2B5EF4-FFF2-40B4-BE49-F238E27FC236}">
-                <a16:creationId xmlns:a16="http://schemas.microsoft.com/office/drawing/2014/main" xmlns="" id="{0C24342D-B9E2-47B5-B81A-3CF878DCED2F}"/>
+                <a16:creationId xmlns="" xmlns:a16="http://schemas.microsoft.com/office/drawing/2014/main" id="{0C24342D-B9E2-47B5-B81A-3CF878DCED2F}"/>
               </a:ext>
             </a:extLst>
           </p:cNvPr>
@@ -8126,7 +8201,7 @@
           <p:cNvPr id="3" name="Content Placeholder 2">
             <a:extLst>
               <a:ext uri="{FF2B5EF4-FFF2-40B4-BE49-F238E27FC236}">
-                <a16:creationId xmlns:a16="http://schemas.microsoft.com/office/drawing/2014/main" xmlns="" id="{A36D81E1-A0E3-463B-ADBE-34714AF9821D}"/>
+                <a16:creationId xmlns="" xmlns:a16="http://schemas.microsoft.com/office/drawing/2014/main" id="{A36D81E1-A0E3-463B-ADBE-34714AF9821D}"/>
               </a:ext>
             </a:extLst>
           </p:cNvPr>
@@ -8289,7 +8364,7 @@
           <p:cNvPr id="2" name="Title 1">
             <a:extLst>
               <a:ext uri="{FF2B5EF4-FFF2-40B4-BE49-F238E27FC236}">
-                <a16:creationId xmlns:a16="http://schemas.microsoft.com/office/drawing/2014/main" xmlns="" id="{BEADEEBC-11E6-45DF-96CB-5EC9C5A2967B}"/>
+                <a16:creationId xmlns="" xmlns:a16="http://schemas.microsoft.com/office/drawing/2014/main" id="{BEADEEBC-11E6-45DF-96CB-5EC9C5A2967B}"/>
               </a:ext>
             </a:extLst>
           </p:cNvPr>
@@ -8317,7 +8392,7 @@
           <p:cNvPr id="3" name="Content Placeholder 2">
             <a:extLst>
               <a:ext uri="{FF2B5EF4-FFF2-40B4-BE49-F238E27FC236}">
-                <a16:creationId xmlns:a16="http://schemas.microsoft.com/office/drawing/2014/main" xmlns="" id="{1ED977EE-D8C7-4054-BE7A-9CE6ABFAC516}"/>
+                <a16:creationId xmlns="" xmlns:a16="http://schemas.microsoft.com/office/drawing/2014/main" id="{1ED977EE-D8C7-4054-BE7A-9CE6ABFAC516}"/>
               </a:ext>
             </a:extLst>
           </p:cNvPr>
@@ -8405,7 +8480,7 @@
           <p:cNvPr id="6" name="Arrow: Right 5">
             <a:extLst>
               <a:ext uri="{FF2B5EF4-FFF2-40B4-BE49-F238E27FC236}">
-                <a16:creationId xmlns:a16="http://schemas.microsoft.com/office/drawing/2014/main" xmlns="" id="{A3302394-896E-459E-9FD4-BF330C1AB43A}"/>
+                <a16:creationId xmlns="" xmlns:a16="http://schemas.microsoft.com/office/drawing/2014/main" id="{A3302394-896E-459E-9FD4-BF330C1AB43A}"/>
               </a:ext>
             </a:extLst>
           </p:cNvPr>
@@ -8481,7 +8556,7 @@
           <p:cNvPr id="2" name="Title 1">
             <a:extLst>
               <a:ext uri="{FF2B5EF4-FFF2-40B4-BE49-F238E27FC236}">
-                <a16:creationId xmlns:a16="http://schemas.microsoft.com/office/drawing/2014/main" xmlns="" id="{A1EB085F-17B5-451D-82C1-612773E8C3AE}"/>
+                <a16:creationId xmlns="" xmlns:a16="http://schemas.microsoft.com/office/drawing/2014/main" id="{A1EB085F-17B5-451D-82C1-612773E8C3AE}"/>
               </a:ext>
             </a:extLst>
           </p:cNvPr>
@@ -8509,7 +8584,7 @@
           <p:cNvPr id="3" name="Content Placeholder 2">
             <a:extLst>
               <a:ext uri="{FF2B5EF4-FFF2-40B4-BE49-F238E27FC236}">
-                <a16:creationId xmlns:a16="http://schemas.microsoft.com/office/drawing/2014/main" xmlns="" id="{B0CFD2E5-C733-4E3F-BB68-8BB2390FE734}"/>
+                <a16:creationId xmlns="" xmlns:a16="http://schemas.microsoft.com/office/drawing/2014/main" id="{B0CFD2E5-C733-4E3F-BB68-8BB2390FE734}"/>
               </a:ext>
             </a:extLst>
           </p:cNvPr>
@@ -8702,7 +8777,7 @@
           <p:cNvPr id="2" name="Title 1">
             <a:extLst>
               <a:ext uri="{FF2B5EF4-FFF2-40B4-BE49-F238E27FC236}">
-                <a16:creationId xmlns:a16="http://schemas.microsoft.com/office/drawing/2014/main" xmlns="" id="{92236404-22D8-4D10-A6A1-9E64CCF13BB7}"/>
+                <a16:creationId xmlns="" xmlns:a16="http://schemas.microsoft.com/office/drawing/2014/main" id="{92236404-22D8-4D10-A6A1-9E64CCF13BB7}"/>
               </a:ext>
             </a:extLst>
           </p:cNvPr>
@@ -8730,7 +8805,7 @@
           <p:cNvPr id="3" name="Content Placeholder 2">
             <a:extLst>
               <a:ext uri="{FF2B5EF4-FFF2-40B4-BE49-F238E27FC236}">
-                <a16:creationId xmlns:a16="http://schemas.microsoft.com/office/drawing/2014/main" xmlns="" id="{3DC812EE-0B6B-433C-9985-56DFD87AA1D8}"/>
+                <a16:creationId xmlns="" xmlns:a16="http://schemas.microsoft.com/office/drawing/2014/main" id="{3DC812EE-0B6B-433C-9985-56DFD87AA1D8}"/>
               </a:ext>
             </a:extLst>
           </p:cNvPr>
@@ -8874,7 +8949,7 @@
           <p:cNvPr id="2" name="Title 1">
             <a:extLst>
               <a:ext uri="{FF2B5EF4-FFF2-40B4-BE49-F238E27FC236}">
-                <a16:creationId xmlns:a16="http://schemas.microsoft.com/office/drawing/2014/main" xmlns="" id="{8AD9C61E-D59B-40D7-8D44-68E2DE4C2050}"/>
+                <a16:creationId xmlns="" xmlns:a16="http://schemas.microsoft.com/office/drawing/2014/main" id="{8AD9C61E-D59B-40D7-8D44-68E2DE4C2050}"/>
               </a:ext>
             </a:extLst>
           </p:cNvPr>
@@ -8902,7 +8977,7 @@
           <p:cNvPr id="3" name="Content Placeholder 2">
             <a:extLst>
               <a:ext uri="{FF2B5EF4-FFF2-40B4-BE49-F238E27FC236}">
-                <a16:creationId xmlns:a16="http://schemas.microsoft.com/office/drawing/2014/main" xmlns="" id="{6BC8DD2F-2584-4560-9215-E9C02829B818}"/>
+                <a16:creationId xmlns="" xmlns:a16="http://schemas.microsoft.com/office/drawing/2014/main" id="{6BC8DD2F-2584-4560-9215-E9C02829B818}"/>
               </a:ext>
             </a:extLst>
           </p:cNvPr>
@@ -9118,7 +9193,7 @@
           <p:cNvPr id="2" name="Title 1">
             <a:extLst>
               <a:ext uri="{FF2B5EF4-FFF2-40B4-BE49-F238E27FC236}">
-                <a16:creationId xmlns:a16="http://schemas.microsoft.com/office/drawing/2014/main" xmlns="" id="{3E4C4127-C4AB-4019-95FF-D331832A85DE}"/>
+                <a16:creationId xmlns="" xmlns:a16="http://schemas.microsoft.com/office/drawing/2014/main" id="{3E4C4127-C4AB-4019-95FF-D331832A85DE}"/>
               </a:ext>
             </a:extLst>
           </p:cNvPr>
@@ -9146,7 +9221,7 @@
           <p:cNvPr id="6" name="Table 6">
             <a:extLst>
               <a:ext uri="{FF2B5EF4-FFF2-40B4-BE49-F238E27FC236}">
-                <a16:creationId xmlns:a16="http://schemas.microsoft.com/office/drawing/2014/main" xmlns="" id="{B0F15519-1F80-4428-B8F4-76C1D911EA22}"/>
+                <a16:creationId xmlns="" xmlns:a16="http://schemas.microsoft.com/office/drawing/2014/main" id="{B0F15519-1F80-4428-B8F4-76C1D911EA22}"/>
               </a:ext>
             </a:extLst>
           </p:cNvPr>
@@ -9176,21 +9251,21 @@
                 <a:gridCol w="1613170">
                   <a:extLst>
                     <a:ext uri="{9D8B030D-6E8A-4147-A177-3AD203B41FA5}">
-                      <a16:colId xmlns:a16="http://schemas.microsoft.com/office/drawing/2014/main" xmlns="" val="2496848852"/>
+                      <a16:colId xmlns="" xmlns:a16="http://schemas.microsoft.com/office/drawing/2014/main" val="2496848852"/>
                     </a:ext>
                   </a:extLst>
                 </a:gridCol>
                 <a:gridCol w="2762656">
                   <a:extLst>
                     <a:ext uri="{9D8B030D-6E8A-4147-A177-3AD203B41FA5}">
-                      <a16:colId xmlns:a16="http://schemas.microsoft.com/office/drawing/2014/main" xmlns="" val="338543402"/>
+                      <a16:colId xmlns="" xmlns:a16="http://schemas.microsoft.com/office/drawing/2014/main" val="338543402"/>
                     </a:ext>
                   </a:extLst>
                 </a:gridCol>
                 <a:gridCol w="2848580">
                   <a:extLst>
                     <a:ext uri="{9D8B030D-6E8A-4147-A177-3AD203B41FA5}">
-                      <a16:colId xmlns:a16="http://schemas.microsoft.com/office/drawing/2014/main" xmlns="" val="584279048"/>
+                      <a16:colId xmlns="" xmlns:a16="http://schemas.microsoft.com/office/drawing/2014/main" val="584279048"/>
                     </a:ext>
                   </a:extLst>
                 </a:gridCol>
@@ -9255,7 +9330,7 @@
                 </a:tc>
                 <a:extLst>
                   <a:ext uri="{0D108BD9-81ED-4DB2-BD59-A6C34878D82A}">
-                    <a16:rowId xmlns:a16="http://schemas.microsoft.com/office/drawing/2014/main" xmlns="" val="3109865242"/>
+                    <a16:rowId xmlns="" xmlns:a16="http://schemas.microsoft.com/office/drawing/2014/main" val="3109865242"/>
                   </a:ext>
                 </a:extLst>
               </a:tr>
@@ -9301,7 +9376,7 @@
                 </a:tc>
                 <a:extLst>
                   <a:ext uri="{0D108BD9-81ED-4DB2-BD59-A6C34878D82A}">
-                    <a16:rowId xmlns:a16="http://schemas.microsoft.com/office/drawing/2014/main" xmlns="" val="2913002108"/>
+                    <a16:rowId xmlns="" xmlns:a16="http://schemas.microsoft.com/office/drawing/2014/main" val="2913002108"/>
                   </a:ext>
                 </a:extLst>
               </a:tr>
@@ -9347,7 +9422,7 @@
                 </a:tc>
                 <a:extLst>
                   <a:ext uri="{0D108BD9-81ED-4DB2-BD59-A6C34878D82A}">
-                    <a16:rowId xmlns:a16="http://schemas.microsoft.com/office/drawing/2014/main" xmlns="" val="2624812194"/>
+                    <a16:rowId xmlns="" xmlns:a16="http://schemas.microsoft.com/office/drawing/2014/main" val="2624812194"/>
                   </a:ext>
                 </a:extLst>
               </a:tr>
@@ -9393,7 +9468,7 @@
                 </a:tc>
                 <a:extLst>
                   <a:ext uri="{0D108BD9-81ED-4DB2-BD59-A6C34878D82A}">
-                    <a16:rowId xmlns:a16="http://schemas.microsoft.com/office/drawing/2014/main" xmlns="" val="4077026338"/>
+                    <a16:rowId xmlns="" xmlns:a16="http://schemas.microsoft.com/office/drawing/2014/main" val="4077026338"/>
                   </a:ext>
                 </a:extLst>
               </a:tr>
@@ -9436,7 +9511,7 @@
           <p:cNvPr id="2" name="Title 1">
             <a:extLst>
               <a:ext uri="{FF2B5EF4-FFF2-40B4-BE49-F238E27FC236}">
-                <a16:creationId xmlns:a16="http://schemas.microsoft.com/office/drawing/2014/main" xmlns="" id="{84FCF981-A6A8-4B36-8185-BF7E8496798A}"/>
+                <a16:creationId xmlns="" xmlns:a16="http://schemas.microsoft.com/office/drawing/2014/main" id="{84FCF981-A6A8-4B36-8185-BF7E8496798A}"/>
               </a:ext>
             </a:extLst>
           </p:cNvPr>
@@ -9464,7 +9539,7 @@
           <p:cNvPr id="3" name="Content Placeholder 2">
             <a:extLst>
               <a:ext uri="{FF2B5EF4-FFF2-40B4-BE49-F238E27FC236}">
-                <a16:creationId xmlns:a16="http://schemas.microsoft.com/office/drawing/2014/main" xmlns="" id="{8180431F-603F-4FC4-9037-AE789745BC58}"/>
+                <a16:creationId xmlns="" xmlns:a16="http://schemas.microsoft.com/office/drawing/2014/main" id="{8180431F-603F-4FC4-9037-AE789745BC58}"/>
               </a:ext>
             </a:extLst>
           </p:cNvPr>
@@ -9741,7 +9816,7 @@
           <p:cNvPr id="2" name="Title 1">
             <a:extLst>
               <a:ext uri="{FF2B5EF4-FFF2-40B4-BE49-F238E27FC236}">
-                <a16:creationId xmlns:a16="http://schemas.microsoft.com/office/drawing/2014/main" xmlns="" id="{363A39DA-CA3E-4829-AA42-84DE5A15EA53}"/>
+                <a16:creationId xmlns="" xmlns:a16="http://schemas.microsoft.com/office/drawing/2014/main" id="{363A39DA-CA3E-4829-AA42-84DE5A15EA53}"/>
               </a:ext>
             </a:extLst>
           </p:cNvPr>
@@ -9769,7 +9844,7 @@
           <p:cNvPr id="3" name="Content Placeholder 2">
             <a:extLst>
               <a:ext uri="{FF2B5EF4-FFF2-40B4-BE49-F238E27FC236}">
-                <a16:creationId xmlns:a16="http://schemas.microsoft.com/office/drawing/2014/main" xmlns="" id="{67C762C5-DC1C-4FCA-8B12-D812D08C1B4B}"/>
+                <a16:creationId xmlns="" xmlns:a16="http://schemas.microsoft.com/office/drawing/2014/main" id="{67C762C5-DC1C-4FCA-8B12-D812D08C1B4B}"/>
               </a:ext>
             </a:extLst>
           </p:cNvPr>
@@ -9950,7 +10025,7 @@
           <p:cNvPr id="2" name="Title 1">
             <a:extLst>
               <a:ext uri="{FF2B5EF4-FFF2-40B4-BE49-F238E27FC236}">
-                <a16:creationId xmlns:a16="http://schemas.microsoft.com/office/drawing/2014/main" xmlns="" id="{4C425A1D-A403-4BE2-AE58-4AE6331FE5B3}"/>
+                <a16:creationId xmlns="" xmlns:a16="http://schemas.microsoft.com/office/drawing/2014/main" id="{4C425A1D-A403-4BE2-AE58-4AE6331FE5B3}"/>
               </a:ext>
             </a:extLst>
           </p:cNvPr>
@@ -9978,7 +10053,7 @@
           <p:cNvPr id="3" name="Content Placeholder 2">
             <a:extLst>
               <a:ext uri="{FF2B5EF4-FFF2-40B4-BE49-F238E27FC236}">
-                <a16:creationId xmlns:a16="http://schemas.microsoft.com/office/drawing/2014/main" xmlns="" id="{484E3CAB-B0F8-4151-9A21-3805EA3CDA4E}"/>
+                <a16:creationId xmlns="" xmlns:a16="http://schemas.microsoft.com/office/drawing/2014/main" id="{484E3CAB-B0F8-4151-9A21-3805EA3CDA4E}"/>
               </a:ext>
             </a:extLst>
           </p:cNvPr>
@@ -10182,7 +10257,7 @@
           <p:cNvPr id="2" name="Title 1">
             <a:extLst>
               <a:ext uri="{FF2B5EF4-FFF2-40B4-BE49-F238E27FC236}">
-                <a16:creationId xmlns:a16="http://schemas.microsoft.com/office/drawing/2014/main" xmlns="" id="{4FEB58FE-D3DF-4E93-B706-39E66BF93065}"/>
+                <a16:creationId xmlns="" xmlns:a16="http://schemas.microsoft.com/office/drawing/2014/main" id="{4FEB58FE-D3DF-4E93-B706-39E66BF93065}"/>
               </a:ext>
             </a:extLst>
           </p:cNvPr>
@@ -10210,7 +10285,7 @@
           <p:cNvPr id="3" name="Content Placeholder 2">
             <a:extLst>
               <a:ext uri="{FF2B5EF4-FFF2-40B4-BE49-F238E27FC236}">
-                <a16:creationId xmlns:a16="http://schemas.microsoft.com/office/drawing/2014/main" xmlns="" id="{D463FBD0-6461-45F2-AA71-CBB1F22AF120}"/>
+                <a16:creationId xmlns="" xmlns:a16="http://schemas.microsoft.com/office/drawing/2014/main" id="{D463FBD0-6461-45F2-AA71-CBB1F22AF120}"/>
               </a:ext>
             </a:extLst>
           </p:cNvPr>
@@ -10570,7 +10645,7 @@
           <p:cNvPr id="2" name="Title 1">
             <a:extLst>
               <a:ext uri="{FF2B5EF4-FFF2-40B4-BE49-F238E27FC236}">
-                <a16:creationId xmlns:a16="http://schemas.microsoft.com/office/drawing/2014/main" xmlns="" id="{25E97CD5-CFCB-4B1A-A33E-EE06161319AC}"/>
+                <a16:creationId xmlns="" xmlns:a16="http://schemas.microsoft.com/office/drawing/2014/main" id="{25E97CD5-CFCB-4B1A-A33E-EE06161319AC}"/>
               </a:ext>
             </a:extLst>
           </p:cNvPr>
@@ -10599,7 +10674,7 @@
           <p:cNvPr id="3" name="Content Placeholder 2">
             <a:extLst>
               <a:ext uri="{FF2B5EF4-FFF2-40B4-BE49-F238E27FC236}">
-                <a16:creationId xmlns:a16="http://schemas.microsoft.com/office/drawing/2014/main" xmlns="" id="{21B59C54-8C42-4611-93FE-FF60F4028477}"/>
+                <a16:creationId xmlns="" xmlns:a16="http://schemas.microsoft.com/office/drawing/2014/main" id="{21B59C54-8C42-4611-93FE-FF60F4028477}"/>
               </a:ext>
             </a:extLst>
           </p:cNvPr>
@@ -10669,11 +10744,7 @@
             </a:r>
             <a:r>
               <a:rPr lang="en-US" dirty="0" smtClean="0"/>
-              <a:t>and names </a:t>
-            </a:r>
-            <a:r>
-              <a:rPr lang="en-US" dirty="0" smtClean="0"/>
-              <a:t>for columns</a:t>
+              <a:t>and names for columns</a:t>
             </a:r>
             <a:endParaRPr lang="sr-Latn-ME" dirty="0"/>
           </a:p>
@@ -10697,11 +10768,7 @@
             </a:r>
             <a:r>
               <a:rPr lang="en-US" dirty="0" smtClean="0"/>
-              <a:t> int</a:t>
-            </a:r>
-            <a:r>
-              <a:rPr lang="en-US" dirty="0" smtClean="0"/>
-              <a:t>o table</a:t>
+              <a:t> into table</a:t>
             </a:r>
             <a:endParaRPr lang="sr-Latn-ME" dirty="0"/>
           </a:p>
@@ -10728,7 +10795,7 @@
           <p:cNvPr id="20484" name="Picture 4" descr="Database Relational Model | Download Scientific Diagram">
             <a:extLst>
               <a:ext uri="{FF2B5EF4-FFF2-40B4-BE49-F238E27FC236}">
-                <a16:creationId xmlns:a16="http://schemas.microsoft.com/office/drawing/2014/main" xmlns="" id="{730BD2C4-BAFA-43AB-8286-6A8AC555A666}"/>
+                <a16:creationId xmlns="" xmlns:a16="http://schemas.microsoft.com/office/drawing/2014/main" id="{730BD2C4-BAFA-43AB-8286-6A8AC555A666}"/>
               </a:ext>
             </a:extLst>
           </p:cNvPr>
@@ -10812,7 +10879,7 @@
           <p:cNvPr id="2" name="Title 1">
             <a:extLst>
               <a:ext uri="{FF2B5EF4-FFF2-40B4-BE49-F238E27FC236}">
-                <a16:creationId xmlns:a16="http://schemas.microsoft.com/office/drawing/2014/main" xmlns="" id="{39EB362E-8406-42DD-99F9-C38F243CCB0F}"/>
+                <a16:creationId xmlns="" xmlns:a16="http://schemas.microsoft.com/office/drawing/2014/main" id="{39EB362E-8406-42DD-99F9-C38F243CCB0F}"/>
               </a:ext>
             </a:extLst>
           </p:cNvPr>
@@ -10850,7 +10917,7 @@
           <p:cNvPr id="3" name="Content Placeholder 2">
             <a:extLst>
               <a:ext uri="{FF2B5EF4-FFF2-40B4-BE49-F238E27FC236}">
-                <a16:creationId xmlns:a16="http://schemas.microsoft.com/office/drawing/2014/main" xmlns="" id="{88F6B6B3-A293-4045-B3AF-AB415DDC363E}"/>
+                <a16:creationId xmlns="" xmlns:a16="http://schemas.microsoft.com/office/drawing/2014/main" id="{88F6B6B3-A293-4045-B3AF-AB415DDC363E}"/>
               </a:ext>
             </a:extLst>
           </p:cNvPr>
@@ -11333,7 +11400,7 @@
           <p:cNvPr id="2" name="Title 1">
             <a:extLst>
               <a:ext uri="{FF2B5EF4-FFF2-40B4-BE49-F238E27FC236}">
-                <a16:creationId xmlns:a16="http://schemas.microsoft.com/office/drawing/2014/main" xmlns="" id="{F0E90DA9-8FE9-47B3-B8D6-1DA2C7093093}"/>
+                <a16:creationId xmlns="" xmlns:a16="http://schemas.microsoft.com/office/drawing/2014/main" id="{F0E90DA9-8FE9-47B3-B8D6-1DA2C7093093}"/>
               </a:ext>
             </a:extLst>
           </p:cNvPr>
@@ -11362,7 +11429,7 @@
           <p:cNvPr id="5" name="Content Placeholder 4">
             <a:extLst>
               <a:ext uri="{FF2B5EF4-FFF2-40B4-BE49-F238E27FC236}">
-                <a16:creationId xmlns:a16="http://schemas.microsoft.com/office/drawing/2014/main" xmlns="" id="{5F62BB9D-9D60-4FD8-AC67-C768F3B5B2FD}"/>
+                <a16:creationId xmlns="" xmlns:a16="http://schemas.microsoft.com/office/drawing/2014/main" id="{5F62BB9D-9D60-4FD8-AC67-C768F3B5B2FD}"/>
               </a:ext>
             </a:extLst>
           </p:cNvPr>
@@ -11622,7 +11689,7 @@
           <p:cNvPr id="2" name="Title 1">
             <a:extLst>
               <a:ext uri="{FF2B5EF4-FFF2-40B4-BE49-F238E27FC236}">
-                <a16:creationId xmlns:a16="http://schemas.microsoft.com/office/drawing/2014/main" xmlns="" id="{F0E90DA9-8FE9-47B3-B8D6-1DA2C7093093}"/>
+                <a16:creationId xmlns="" xmlns:a16="http://schemas.microsoft.com/office/drawing/2014/main" id="{F0E90DA9-8FE9-47B3-B8D6-1DA2C7093093}"/>
               </a:ext>
             </a:extLst>
           </p:cNvPr>
@@ -11651,7 +11718,7 @@
           <p:cNvPr id="5" name="Content Placeholder 4">
             <a:extLst>
               <a:ext uri="{FF2B5EF4-FFF2-40B4-BE49-F238E27FC236}">
-                <a16:creationId xmlns:a16="http://schemas.microsoft.com/office/drawing/2014/main" xmlns="" id="{5F62BB9D-9D60-4FD8-AC67-C768F3B5B2FD}"/>
+                <a16:creationId xmlns="" xmlns:a16="http://schemas.microsoft.com/office/drawing/2014/main" id="{5F62BB9D-9D60-4FD8-AC67-C768F3B5B2FD}"/>
               </a:ext>
             </a:extLst>
           </p:cNvPr>
@@ -11878,7 +11945,7 @@
           <p:cNvPr id="2" name="Title 1">
             <a:extLst>
               <a:ext uri="{FF2B5EF4-FFF2-40B4-BE49-F238E27FC236}">
-                <a16:creationId xmlns:a16="http://schemas.microsoft.com/office/drawing/2014/main" xmlns="" id="{602548CE-70CC-4BA9-9F5E-C7E301331CEB}"/>
+                <a16:creationId xmlns="" xmlns:a16="http://schemas.microsoft.com/office/drawing/2014/main" id="{602548CE-70CC-4BA9-9F5E-C7E301331CEB}"/>
               </a:ext>
             </a:extLst>
           </p:cNvPr>
@@ -11906,7 +11973,7 @@
           <p:cNvPr id="7" name="Content Placeholder 6">
             <a:extLst>
               <a:ext uri="{FF2B5EF4-FFF2-40B4-BE49-F238E27FC236}">
-                <a16:creationId xmlns:a16="http://schemas.microsoft.com/office/drawing/2014/main" xmlns="" id="{0FF4988F-FBDB-4009-80EF-6CF379E576A2}"/>
+                <a16:creationId xmlns="" xmlns:a16="http://schemas.microsoft.com/office/drawing/2014/main" id="{0FF4988F-FBDB-4009-80EF-6CF379E576A2}"/>
               </a:ext>
             </a:extLst>
           </p:cNvPr>
@@ -11934,21 +12001,21 @@
                 <a:gridCol w="1681805">
                   <a:extLst>
                     <a:ext uri="{9D8B030D-6E8A-4147-A177-3AD203B41FA5}">
-                      <a16:colId xmlns:a16="http://schemas.microsoft.com/office/drawing/2014/main" xmlns="" val="168047347"/>
+                      <a16:colId xmlns="" xmlns:a16="http://schemas.microsoft.com/office/drawing/2014/main" val="168047347"/>
                     </a:ext>
                   </a:extLst>
                 </a:gridCol>
                 <a:gridCol w="5913014">
                   <a:extLst>
                     <a:ext uri="{9D8B030D-6E8A-4147-A177-3AD203B41FA5}">
-                      <a16:colId xmlns:a16="http://schemas.microsoft.com/office/drawing/2014/main" xmlns="" val="1449612977"/>
+                      <a16:colId xmlns="" xmlns:a16="http://schemas.microsoft.com/office/drawing/2014/main" val="1449612977"/>
                     </a:ext>
                   </a:extLst>
                 </a:gridCol>
                 <a:gridCol w="840903">
                   <a:extLst>
                     <a:ext uri="{9D8B030D-6E8A-4147-A177-3AD203B41FA5}">
-                      <a16:colId xmlns:a16="http://schemas.microsoft.com/office/drawing/2014/main" xmlns="" val="917108113"/>
+                      <a16:colId xmlns="" xmlns:a16="http://schemas.microsoft.com/office/drawing/2014/main" val="917108113"/>
                     </a:ext>
                   </a:extLst>
                 </a:gridCol>
@@ -12124,7 +12191,7 @@
                 </a:tc>
                 <a:extLst>
                   <a:ext uri="{0D108BD9-81ED-4DB2-BD59-A6C34878D82A}">
-                    <a16:rowId xmlns:a16="http://schemas.microsoft.com/office/drawing/2014/main" xmlns="" val="4017442797"/>
+                    <a16:rowId xmlns="" xmlns:a16="http://schemas.microsoft.com/office/drawing/2014/main" val="4017442797"/>
                   </a:ext>
                 </a:extLst>
               </a:tr>
@@ -12302,7 +12369,7 @@
                 </a:tc>
                 <a:extLst>
                   <a:ext uri="{0D108BD9-81ED-4DB2-BD59-A6C34878D82A}">
-                    <a16:rowId xmlns:a16="http://schemas.microsoft.com/office/drawing/2014/main" xmlns="" val="3808223974"/>
+                    <a16:rowId xmlns="" xmlns:a16="http://schemas.microsoft.com/office/drawing/2014/main" val="3808223974"/>
                   </a:ext>
                 </a:extLst>
               </a:tr>
@@ -12477,7 +12544,7 @@
                 </a:tc>
                 <a:extLst>
                   <a:ext uri="{0D108BD9-81ED-4DB2-BD59-A6C34878D82A}">
-                    <a16:rowId xmlns:a16="http://schemas.microsoft.com/office/drawing/2014/main" xmlns="" val="486151207"/>
+                    <a16:rowId xmlns="" xmlns:a16="http://schemas.microsoft.com/office/drawing/2014/main" val="486151207"/>
                   </a:ext>
                 </a:extLst>
               </a:tr>
@@ -12652,7 +12719,7 @@
                 </a:tc>
                 <a:extLst>
                   <a:ext uri="{0D108BD9-81ED-4DB2-BD59-A6C34878D82A}">
-                    <a16:rowId xmlns:a16="http://schemas.microsoft.com/office/drawing/2014/main" xmlns="" val="1041736898"/>
+                    <a16:rowId xmlns="" xmlns:a16="http://schemas.microsoft.com/office/drawing/2014/main" val="1041736898"/>
                   </a:ext>
                 </a:extLst>
               </a:tr>
@@ -12830,7 +12897,7 @@
                 </a:tc>
                 <a:extLst>
                   <a:ext uri="{0D108BD9-81ED-4DB2-BD59-A6C34878D82A}">
-                    <a16:rowId xmlns:a16="http://schemas.microsoft.com/office/drawing/2014/main" xmlns="" val="2109048823"/>
+                    <a16:rowId xmlns="" xmlns:a16="http://schemas.microsoft.com/office/drawing/2014/main" val="2109048823"/>
                   </a:ext>
                 </a:extLst>
               </a:tr>
@@ -13005,7 +13072,7 @@
                 </a:tc>
                 <a:extLst>
                   <a:ext uri="{0D108BD9-81ED-4DB2-BD59-A6C34878D82A}">
-                    <a16:rowId xmlns:a16="http://schemas.microsoft.com/office/drawing/2014/main" xmlns="" val="2357796830"/>
+                    <a16:rowId xmlns="" xmlns:a16="http://schemas.microsoft.com/office/drawing/2014/main" val="2357796830"/>
                   </a:ext>
                 </a:extLst>
               </a:tr>
@@ -13192,7 +13259,7 @@
                 </a:tc>
                 <a:extLst>
                   <a:ext uri="{0D108BD9-81ED-4DB2-BD59-A6C34878D82A}">
-                    <a16:rowId xmlns:a16="http://schemas.microsoft.com/office/drawing/2014/main" xmlns="" val="2764685305"/>
+                    <a16:rowId xmlns="" xmlns:a16="http://schemas.microsoft.com/office/drawing/2014/main" val="2764685305"/>
                   </a:ext>
                 </a:extLst>
               </a:tr>
@@ -13242,7 +13309,7 @@
           <p:cNvPr id="2" name="Title 1">
             <a:extLst>
               <a:ext uri="{FF2B5EF4-FFF2-40B4-BE49-F238E27FC236}">
-                <a16:creationId xmlns:a16="http://schemas.microsoft.com/office/drawing/2014/main" xmlns="" id="{CE317DB0-8477-470A-882E-4C183966D4EB}"/>
+                <a16:creationId xmlns="" xmlns:a16="http://schemas.microsoft.com/office/drawing/2014/main" id="{CE317DB0-8477-470A-882E-4C183966D4EB}"/>
               </a:ext>
             </a:extLst>
           </p:cNvPr>
@@ -13275,7 +13342,7 @@
           <p:cNvPr id="7" name="Content Placeholder 6">
             <a:extLst>
               <a:ext uri="{FF2B5EF4-FFF2-40B4-BE49-F238E27FC236}">
-                <a16:creationId xmlns:a16="http://schemas.microsoft.com/office/drawing/2014/main" xmlns="" id="{4E6FEC6D-A8F8-47D5-AA06-3D1ABC699F64}"/>
+                <a16:creationId xmlns="" xmlns:a16="http://schemas.microsoft.com/office/drawing/2014/main" id="{4E6FEC6D-A8F8-47D5-AA06-3D1ABC699F64}"/>
               </a:ext>
             </a:extLst>
           </p:cNvPr>
@@ -13303,21 +13370,21 @@
                 <a:gridCol w="1650347">
                   <a:extLst>
                     <a:ext uri="{9D8B030D-6E8A-4147-A177-3AD203B41FA5}">
-                      <a16:colId xmlns:a16="http://schemas.microsoft.com/office/drawing/2014/main" xmlns="" val="3103321543"/>
+                      <a16:colId xmlns="" xmlns:a16="http://schemas.microsoft.com/office/drawing/2014/main" val="3103321543"/>
                     </a:ext>
                   </a:extLst>
                 </a:gridCol>
                 <a:gridCol w="4926842">
                   <a:extLst>
                     <a:ext uri="{9D8B030D-6E8A-4147-A177-3AD203B41FA5}">
-                      <a16:colId xmlns:a16="http://schemas.microsoft.com/office/drawing/2014/main" xmlns="" val="966477166"/>
+                      <a16:colId xmlns="" xmlns:a16="http://schemas.microsoft.com/office/drawing/2014/main" val="966477166"/>
                     </a:ext>
                   </a:extLst>
                 </a:gridCol>
                 <a:gridCol w="1513916">
                   <a:extLst>
                     <a:ext uri="{9D8B030D-6E8A-4147-A177-3AD203B41FA5}">
-                      <a16:colId xmlns:a16="http://schemas.microsoft.com/office/drawing/2014/main" xmlns="" val="1268854795"/>
+                      <a16:colId xmlns="" xmlns:a16="http://schemas.microsoft.com/office/drawing/2014/main" val="1268854795"/>
                     </a:ext>
                   </a:extLst>
                 </a:gridCol>
@@ -13544,7 +13611,7 @@
                 </a:tc>
                 <a:extLst>
                   <a:ext uri="{0D108BD9-81ED-4DB2-BD59-A6C34878D82A}">
-                    <a16:rowId xmlns:a16="http://schemas.microsoft.com/office/drawing/2014/main" xmlns="" val="1023366608"/>
+                    <a16:rowId xmlns="" xmlns:a16="http://schemas.microsoft.com/office/drawing/2014/main" val="1023366608"/>
                   </a:ext>
                 </a:extLst>
               </a:tr>
@@ -13722,7 +13789,7 @@
                 </a:tc>
                 <a:extLst>
                   <a:ext uri="{0D108BD9-81ED-4DB2-BD59-A6C34878D82A}">
-                    <a16:rowId xmlns:a16="http://schemas.microsoft.com/office/drawing/2014/main" xmlns="" val="4248743680"/>
+                    <a16:rowId xmlns="" xmlns:a16="http://schemas.microsoft.com/office/drawing/2014/main" val="4248743680"/>
                   </a:ext>
                 </a:extLst>
               </a:tr>
@@ -13900,7 +13967,7 @@
                 </a:tc>
                 <a:extLst>
                   <a:ext uri="{0D108BD9-81ED-4DB2-BD59-A6C34878D82A}">
-                    <a16:rowId xmlns:a16="http://schemas.microsoft.com/office/drawing/2014/main" xmlns="" val="2779657021"/>
+                    <a16:rowId xmlns="" xmlns:a16="http://schemas.microsoft.com/office/drawing/2014/main" val="2779657021"/>
                   </a:ext>
                 </a:extLst>
               </a:tr>
@@ -14090,7 +14157,7 @@
                 </a:tc>
                 <a:extLst>
                   <a:ext uri="{0D108BD9-81ED-4DB2-BD59-A6C34878D82A}">
-                    <a16:rowId xmlns:a16="http://schemas.microsoft.com/office/drawing/2014/main" xmlns="" val="1772262339"/>
+                    <a16:rowId xmlns="" xmlns:a16="http://schemas.microsoft.com/office/drawing/2014/main" val="1772262339"/>
                   </a:ext>
                 </a:extLst>
               </a:tr>
@@ -14268,7 +14335,7 @@
                 </a:tc>
                 <a:extLst>
                   <a:ext uri="{0D108BD9-81ED-4DB2-BD59-A6C34878D82A}">
-                    <a16:rowId xmlns:a16="http://schemas.microsoft.com/office/drawing/2014/main" xmlns="" val="353961315"/>
+                    <a16:rowId xmlns="" xmlns:a16="http://schemas.microsoft.com/office/drawing/2014/main" val="353961315"/>
                   </a:ext>
                 </a:extLst>
               </a:tr>
@@ -14286,6 +14353,13 @@
   <p:clrMapOvr>
     <a:masterClrMapping/>
   </p:clrMapOvr>
+  <p:timing>
+    <p:tnLst>
+      <p:par>
+        <p:cTn id="1" dur="indefinite" restart="never" nodeType="tmRoot"/>
+      </p:par>
+    </p:tnLst>
+  </p:timing>
 </p:sld>
 </file>
 
@@ -14311,7 +14385,7 @@
           <p:cNvPr id="2" name="Title 1">
             <a:extLst>
               <a:ext uri="{FF2B5EF4-FFF2-40B4-BE49-F238E27FC236}">
-                <a16:creationId xmlns:a16="http://schemas.microsoft.com/office/drawing/2014/main" xmlns="" id="{CC56882C-8D64-44B2-9056-05826A2A8821}"/>
+                <a16:creationId xmlns="" xmlns:a16="http://schemas.microsoft.com/office/drawing/2014/main" id="{CC56882C-8D64-44B2-9056-05826A2A8821}"/>
               </a:ext>
             </a:extLst>
           </p:cNvPr>
@@ -14339,7 +14413,7 @@
           <p:cNvPr id="6" name="Table 5">
             <a:extLst>
               <a:ext uri="{FF2B5EF4-FFF2-40B4-BE49-F238E27FC236}">
-                <a16:creationId xmlns:a16="http://schemas.microsoft.com/office/drawing/2014/main" xmlns="" id="{EA049CDD-4F33-4A6B-9CD1-7147D9D0F6F2}"/>
+                <a16:creationId xmlns="" xmlns:a16="http://schemas.microsoft.com/office/drawing/2014/main" id="{EA049CDD-4F33-4A6B-9CD1-7147D9D0F6F2}"/>
               </a:ext>
             </a:extLst>
           </p:cNvPr>
@@ -14366,28 +14440,28 @@
                 <a:gridCol w="3012528">
                   <a:extLst>
                     <a:ext uri="{9D8B030D-6E8A-4147-A177-3AD203B41FA5}">
-                      <a16:colId xmlns:a16="http://schemas.microsoft.com/office/drawing/2014/main" xmlns="" val="161640752"/>
+                      <a16:colId xmlns="" xmlns:a16="http://schemas.microsoft.com/office/drawing/2014/main" val="161640752"/>
                     </a:ext>
                   </a:extLst>
                 </a:gridCol>
                 <a:gridCol w="2353704">
                   <a:extLst>
                     <a:ext uri="{9D8B030D-6E8A-4147-A177-3AD203B41FA5}">
-                      <a16:colId xmlns:a16="http://schemas.microsoft.com/office/drawing/2014/main" xmlns="" val="1439636965"/>
+                      <a16:colId xmlns="" xmlns:a16="http://schemas.microsoft.com/office/drawing/2014/main" val="1439636965"/>
                     </a:ext>
                   </a:extLst>
                 </a:gridCol>
                 <a:gridCol w="2353704">
                   <a:extLst>
                     <a:ext uri="{9D8B030D-6E8A-4147-A177-3AD203B41FA5}">
-                      <a16:colId xmlns:a16="http://schemas.microsoft.com/office/drawing/2014/main" xmlns="" val="1088626771"/>
+                      <a16:colId xmlns="" xmlns:a16="http://schemas.microsoft.com/office/drawing/2014/main" val="1088626771"/>
                     </a:ext>
                   </a:extLst>
                 </a:gridCol>
                 <a:gridCol w="2353704">
                   <a:extLst>
                     <a:ext uri="{9D8B030D-6E8A-4147-A177-3AD203B41FA5}">
-                      <a16:colId xmlns:a16="http://schemas.microsoft.com/office/drawing/2014/main" xmlns="" val="3654229003"/>
+                      <a16:colId xmlns="" xmlns:a16="http://schemas.microsoft.com/office/drawing/2014/main" val="3654229003"/>
                     </a:ext>
                   </a:extLst>
                 </a:gridCol>
@@ -14619,7 +14693,7 @@
                 </a:tc>
                 <a:extLst>
                   <a:ext uri="{0D108BD9-81ED-4DB2-BD59-A6C34878D82A}">
-                    <a16:rowId xmlns:a16="http://schemas.microsoft.com/office/drawing/2014/main" xmlns="" val="2095317437"/>
+                    <a16:rowId xmlns="" xmlns:a16="http://schemas.microsoft.com/office/drawing/2014/main" val="2095317437"/>
                   </a:ext>
                 </a:extLst>
               </a:tr>
@@ -14850,7 +14924,7 @@
                 </a:tc>
                 <a:extLst>
                   <a:ext uri="{0D108BD9-81ED-4DB2-BD59-A6C34878D82A}">
-                    <a16:rowId xmlns:a16="http://schemas.microsoft.com/office/drawing/2014/main" xmlns="" val="3308195632"/>
+                    <a16:rowId xmlns="" xmlns:a16="http://schemas.microsoft.com/office/drawing/2014/main" val="3308195632"/>
                   </a:ext>
                 </a:extLst>
               </a:tr>
@@ -15084,7 +15158,7 @@
                 </a:tc>
                 <a:extLst>
                   <a:ext uri="{0D108BD9-81ED-4DB2-BD59-A6C34878D82A}">
-                    <a16:rowId xmlns:a16="http://schemas.microsoft.com/office/drawing/2014/main" xmlns="" val="3930368869"/>
+                    <a16:rowId xmlns="" xmlns:a16="http://schemas.microsoft.com/office/drawing/2014/main" val="3930368869"/>
                   </a:ext>
                 </a:extLst>
               </a:tr>
@@ -15318,7 +15392,7 @@
                 </a:tc>
                 <a:extLst>
                   <a:ext uri="{0D108BD9-81ED-4DB2-BD59-A6C34878D82A}">
-                    <a16:rowId xmlns:a16="http://schemas.microsoft.com/office/drawing/2014/main" xmlns="" val="3139353499"/>
+                    <a16:rowId xmlns="" xmlns:a16="http://schemas.microsoft.com/office/drawing/2014/main" val="3139353499"/>
                   </a:ext>
                 </a:extLst>
               </a:tr>
@@ -15549,7 +15623,7 @@
                 </a:tc>
                 <a:extLst>
                   <a:ext uri="{0D108BD9-81ED-4DB2-BD59-A6C34878D82A}">
-                    <a16:rowId xmlns:a16="http://schemas.microsoft.com/office/drawing/2014/main" xmlns="" val="3915610649"/>
+                    <a16:rowId xmlns="" xmlns:a16="http://schemas.microsoft.com/office/drawing/2014/main" val="3915610649"/>
                   </a:ext>
                 </a:extLst>
               </a:tr>
@@ -15780,7 +15854,7 @@
                 </a:tc>
                 <a:extLst>
                   <a:ext uri="{0D108BD9-81ED-4DB2-BD59-A6C34878D82A}">
-                    <a16:rowId xmlns:a16="http://schemas.microsoft.com/office/drawing/2014/main" xmlns="" val="3432981918"/>
+                    <a16:rowId xmlns="" xmlns:a16="http://schemas.microsoft.com/office/drawing/2014/main" val="3432981918"/>
                   </a:ext>
                 </a:extLst>
               </a:tr>
@@ -15798,6 +15872,13 @@
   <p:clrMapOvr>
     <a:masterClrMapping/>
   </p:clrMapOvr>
+  <p:timing>
+    <p:tnLst>
+      <p:par>
+        <p:cTn id="1" dur="indefinite" restart="never" nodeType="tmRoot"/>
+      </p:par>
+    </p:tnLst>
+  </p:timing>
 </p:sld>
 </file>
 
@@ -15823,7 +15904,7 @@
           <p:cNvPr id="2" name="Title 1">
             <a:extLst>
               <a:ext uri="{FF2B5EF4-FFF2-40B4-BE49-F238E27FC236}">
-                <a16:creationId xmlns:a16="http://schemas.microsoft.com/office/drawing/2014/main" xmlns="" id="{F3E9AC1D-155C-4935-947A-A84216C8D605}"/>
+                <a16:creationId xmlns="" xmlns:a16="http://schemas.microsoft.com/office/drawing/2014/main" id="{F3E9AC1D-155C-4935-947A-A84216C8D605}"/>
               </a:ext>
             </a:extLst>
           </p:cNvPr>
@@ -15851,7 +15932,7 @@
           <p:cNvPr id="4" name="Content Placeholder 3">
             <a:extLst>
               <a:ext uri="{FF2B5EF4-FFF2-40B4-BE49-F238E27FC236}">
-                <a16:creationId xmlns:a16="http://schemas.microsoft.com/office/drawing/2014/main" xmlns="" id="{33A94FB0-4D77-4847-85DA-7179C2A1CB73}"/>
+                <a16:creationId xmlns="" xmlns:a16="http://schemas.microsoft.com/office/drawing/2014/main" id="{33A94FB0-4D77-4847-85DA-7179C2A1CB73}"/>
               </a:ext>
             </a:extLst>
           </p:cNvPr>
@@ -15874,28 +15955,28 @@
                 <a:gridCol w="2370729">
                   <a:extLst>
                     <a:ext uri="{9D8B030D-6E8A-4147-A177-3AD203B41FA5}">
-                      <a16:colId xmlns:a16="http://schemas.microsoft.com/office/drawing/2014/main" xmlns="" val="2555121221"/>
+                      <a16:colId xmlns="" xmlns:a16="http://schemas.microsoft.com/office/drawing/2014/main" val="2555121221"/>
                     </a:ext>
                   </a:extLst>
                 </a:gridCol>
                 <a:gridCol w="2370729">
                   <a:extLst>
                     <a:ext uri="{9D8B030D-6E8A-4147-A177-3AD203B41FA5}">
-                      <a16:colId xmlns:a16="http://schemas.microsoft.com/office/drawing/2014/main" xmlns="" val="781044161"/>
+                      <a16:colId xmlns="" xmlns:a16="http://schemas.microsoft.com/office/drawing/2014/main" val="781044161"/>
                     </a:ext>
                   </a:extLst>
                 </a:gridCol>
                 <a:gridCol w="2370729">
                   <a:extLst>
                     <a:ext uri="{9D8B030D-6E8A-4147-A177-3AD203B41FA5}">
-                      <a16:colId xmlns:a16="http://schemas.microsoft.com/office/drawing/2014/main" xmlns="" val="573149686"/>
+                      <a16:colId xmlns="" xmlns:a16="http://schemas.microsoft.com/office/drawing/2014/main" val="573149686"/>
                     </a:ext>
                   </a:extLst>
                 </a:gridCol>
                 <a:gridCol w="2370729">
                   <a:extLst>
                     <a:ext uri="{9D8B030D-6E8A-4147-A177-3AD203B41FA5}">
-                      <a16:colId xmlns:a16="http://schemas.microsoft.com/office/drawing/2014/main" xmlns="" val="3898472671"/>
+                      <a16:colId xmlns="" xmlns:a16="http://schemas.microsoft.com/office/drawing/2014/main" val="3898472671"/>
                     </a:ext>
                   </a:extLst>
                 </a:gridCol>
@@ -16127,7 +16208,7 @@
                 </a:tc>
                 <a:extLst>
                   <a:ext uri="{0D108BD9-81ED-4DB2-BD59-A6C34878D82A}">
-                    <a16:rowId xmlns:a16="http://schemas.microsoft.com/office/drawing/2014/main" xmlns="" val="1025259857"/>
+                    <a16:rowId xmlns="" xmlns:a16="http://schemas.microsoft.com/office/drawing/2014/main" val="1025259857"/>
                   </a:ext>
                 </a:extLst>
               </a:tr>
@@ -16358,7 +16439,7 @@
                 </a:tc>
                 <a:extLst>
                   <a:ext uri="{0D108BD9-81ED-4DB2-BD59-A6C34878D82A}">
-                    <a16:rowId xmlns:a16="http://schemas.microsoft.com/office/drawing/2014/main" xmlns="" val="3298186729"/>
+                    <a16:rowId xmlns="" xmlns:a16="http://schemas.microsoft.com/office/drawing/2014/main" val="3298186729"/>
                   </a:ext>
                 </a:extLst>
               </a:tr>
@@ -16589,7 +16670,7 @@
                 </a:tc>
                 <a:extLst>
                   <a:ext uri="{0D108BD9-81ED-4DB2-BD59-A6C34878D82A}">
-                    <a16:rowId xmlns:a16="http://schemas.microsoft.com/office/drawing/2014/main" xmlns="" val="1989762672"/>
+                    <a16:rowId xmlns="" xmlns:a16="http://schemas.microsoft.com/office/drawing/2014/main" val="1989762672"/>
                   </a:ext>
                 </a:extLst>
               </a:tr>
@@ -16820,7 +16901,7 @@
                 </a:tc>
                 <a:extLst>
                   <a:ext uri="{0D108BD9-81ED-4DB2-BD59-A6C34878D82A}">
-                    <a16:rowId xmlns:a16="http://schemas.microsoft.com/office/drawing/2014/main" xmlns="" val="3410910077"/>
+                    <a16:rowId xmlns="" xmlns:a16="http://schemas.microsoft.com/office/drawing/2014/main" val="3410910077"/>
                   </a:ext>
                 </a:extLst>
               </a:tr>
@@ -17051,7 +17132,7 @@
                 </a:tc>
                 <a:extLst>
                   <a:ext uri="{0D108BD9-81ED-4DB2-BD59-A6C34878D82A}">
-                    <a16:rowId xmlns:a16="http://schemas.microsoft.com/office/drawing/2014/main" xmlns="" val="1704474040"/>
+                    <a16:rowId xmlns="" xmlns:a16="http://schemas.microsoft.com/office/drawing/2014/main" val="1704474040"/>
                   </a:ext>
                 </a:extLst>
               </a:tr>
@@ -17282,7 +17363,7 @@
                 </a:tc>
                 <a:extLst>
                   <a:ext uri="{0D108BD9-81ED-4DB2-BD59-A6C34878D82A}">
-                    <a16:rowId xmlns:a16="http://schemas.microsoft.com/office/drawing/2014/main" xmlns="" val="2963491453"/>
+                    <a16:rowId xmlns="" xmlns:a16="http://schemas.microsoft.com/office/drawing/2014/main" val="2963491453"/>
                   </a:ext>
                 </a:extLst>
               </a:tr>
@@ -17513,7 +17594,7 @@
                 </a:tc>
                 <a:extLst>
                   <a:ext uri="{0D108BD9-81ED-4DB2-BD59-A6C34878D82A}">
-                    <a16:rowId xmlns:a16="http://schemas.microsoft.com/office/drawing/2014/main" xmlns="" val="4079285811"/>
+                    <a16:rowId xmlns="" xmlns:a16="http://schemas.microsoft.com/office/drawing/2014/main" val="4079285811"/>
                   </a:ext>
                 </a:extLst>
               </a:tr>
@@ -17531,6 +17612,13 @@
   <p:clrMapOvr>
     <a:masterClrMapping/>
   </p:clrMapOvr>
+  <p:timing>
+    <p:tnLst>
+      <p:par>
+        <p:cTn id="1" dur="indefinite" restart="never" nodeType="tmRoot"/>
+      </p:par>
+    </p:tnLst>
+  </p:timing>
 </p:sld>
 </file>
 
@@ -17556,7 +17644,7 @@
           <p:cNvPr id="2" name="Title 1">
             <a:extLst>
               <a:ext uri="{FF2B5EF4-FFF2-40B4-BE49-F238E27FC236}">
-                <a16:creationId xmlns:a16="http://schemas.microsoft.com/office/drawing/2014/main" xmlns="" id="{332AA275-2C24-4038-A489-CD711FD3173F}"/>
+                <a16:creationId xmlns="" xmlns:a16="http://schemas.microsoft.com/office/drawing/2014/main" id="{332AA275-2C24-4038-A489-CD711FD3173F}"/>
               </a:ext>
             </a:extLst>
           </p:cNvPr>
@@ -17584,7 +17672,7 @@
           <p:cNvPr id="4" name="Content Placeholder 3">
             <a:extLst>
               <a:ext uri="{FF2B5EF4-FFF2-40B4-BE49-F238E27FC236}">
-                <a16:creationId xmlns:a16="http://schemas.microsoft.com/office/drawing/2014/main" xmlns="" id="{8F425488-113F-42CE-8B16-9E54A6EFA700}"/>
+                <a16:creationId xmlns="" xmlns:a16="http://schemas.microsoft.com/office/drawing/2014/main" id="{8F425488-113F-42CE-8B16-9E54A6EFA700}"/>
               </a:ext>
             </a:extLst>
           </p:cNvPr>
@@ -17612,14 +17700,14 @@
                 <a:gridCol w="2306229">
                   <a:extLst>
                     <a:ext uri="{9D8B030D-6E8A-4147-A177-3AD203B41FA5}">
-                      <a16:colId xmlns:a16="http://schemas.microsoft.com/office/drawing/2014/main" xmlns="" val="3972080119"/>
+                      <a16:colId xmlns="" xmlns:a16="http://schemas.microsoft.com/office/drawing/2014/main" val="3972080119"/>
                     </a:ext>
                   </a:extLst>
                 </a:gridCol>
                 <a:gridCol w="5405607">
                   <a:extLst>
                     <a:ext uri="{9D8B030D-6E8A-4147-A177-3AD203B41FA5}">
-                      <a16:colId xmlns:a16="http://schemas.microsoft.com/office/drawing/2014/main" xmlns="" val="2807644591"/>
+                      <a16:colId xmlns="" xmlns:a16="http://schemas.microsoft.com/office/drawing/2014/main" val="2807644591"/>
                     </a:ext>
                   </a:extLst>
                 </a:gridCol>
@@ -17739,7 +17827,7 @@
                 </a:tc>
                 <a:extLst>
                   <a:ext uri="{0D108BD9-81ED-4DB2-BD59-A6C34878D82A}">
-                    <a16:rowId xmlns:a16="http://schemas.microsoft.com/office/drawing/2014/main" xmlns="" val="2109257207"/>
+                    <a16:rowId xmlns="" xmlns:a16="http://schemas.microsoft.com/office/drawing/2014/main" val="2109257207"/>
                   </a:ext>
                 </a:extLst>
               </a:tr>
@@ -17861,7 +17949,7 @@
                 </a:tc>
                 <a:extLst>
                   <a:ext uri="{0D108BD9-81ED-4DB2-BD59-A6C34878D82A}">
-                    <a16:rowId xmlns:a16="http://schemas.microsoft.com/office/drawing/2014/main" xmlns="" val="986246760"/>
+                    <a16:rowId xmlns="" xmlns:a16="http://schemas.microsoft.com/office/drawing/2014/main" val="986246760"/>
                   </a:ext>
                 </a:extLst>
               </a:tr>
@@ -18001,7 +18089,7 @@
                 </a:tc>
                 <a:extLst>
                   <a:ext uri="{0D108BD9-81ED-4DB2-BD59-A6C34878D82A}">
-                    <a16:rowId xmlns:a16="http://schemas.microsoft.com/office/drawing/2014/main" xmlns="" val="2570688829"/>
+                    <a16:rowId xmlns="" xmlns:a16="http://schemas.microsoft.com/office/drawing/2014/main" val="2570688829"/>
                   </a:ext>
                 </a:extLst>
               </a:tr>
@@ -18141,7 +18229,7 @@
                 </a:tc>
                 <a:extLst>
                   <a:ext uri="{0D108BD9-81ED-4DB2-BD59-A6C34878D82A}">
-                    <a16:rowId xmlns:a16="http://schemas.microsoft.com/office/drawing/2014/main" xmlns="" val="1767120416"/>
+                    <a16:rowId xmlns="" xmlns:a16="http://schemas.microsoft.com/office/drawing/2014/main" val="1767120416"/>
                   </a:ext>
                 </a:extLst>
               </a:tr>
@@ -18272,7 +18360,7 @@
                 </a:tc>
                 <a:extLst>
                   <a:ext uri="{0D108BD9-81ED-4DB2-BD59-A6C34878D82A}">
-                    <a16:rowId xmlns:a16="http://schemas.microsoft.com/office/drawing/2014/main" xmlns="" val="4099789442"/>
+                    <a16:rowId xmlns="" xmlns:a16="http://schemas.microsoft.com/office/drawing/2014/main" val="4099789442"/>
                   </a:ext>
                 </a:extLst>
               </a:tr>
@@ -18402,7 +18490,7 @@
                 </a:tc>
                 <a:extLst>
                   <a:ext uri="{0D108BD9-81ED-4DB2-BD59-A6C34878D82A}">
-                    <a16:rowId xmlns:a16="http://schemas.microsoft.com/office/drawing/2014/main" xmlns="" val="1182639002"/>
+                    <a16:rowId xmlns="" xmlns:a16="http://schemas.microsoft.com/office/drawing/2014/main" val="1182639002"/>
                   </a:ext>
                 </a:extLst>
               </a:tr>
@@ -18420,6 +18508,13 @@
   <p:clrMapOvr>
     <a:masterClrMapping/>
   </p:clrMapOvr>
+  <p:timing>
+    <p:tnLst>
+      <p:par>
+        <p:cTn id="1" dur="indefinite" restart="never" nodeType="tmRoot"/>
+      </p:par>
+    </p:tnLst>
+  </p:timing>
 </p:sld>
 </file>
 
@@ -18445,7 +18540,7 @@
           <p:cNvPr id="2" name="Title 1">
             <a:extLst>
               <a:ext uri="{FF2B5EF4-FFF2-40B4-BE49-F238E27FC236}">
-                <a16:creationId xmlns:a16="http://schemas.microsoft.com/office/drawing/2014/main" xmlns="" id="{228C05EF-903B-428B-9DAE-F7505C58B917}"/>
+                <a16:creationId xmlns="" xmlns:a16="http://schemas.microsoft.com/office/drawing/2014/main" id="{228C05EF-903B-428B-9DAE-F7505C58B917}"/>
               </a:ext>
             </a:extLst>
           </p:cNvPr>
@@ -18478,7 +18573,7 @@
           <p:cNvPr id="21" name="Arrow: Down 20">
             <a:extLst>
               <a:ext uri="{FF2B5EF4-FFF2-40B4-BE49-F238E27FC236}">
-                <a16:creationId xmlns:a16="http://schemas.microsoft.com/office/drawing/2014/main" xmlns="" id="{0F8E3E57-51A5-4B1B-BAC7-1154CF5148CB}"/>
+                <a16:creationId xmlns="" xmlns:a16="http://schemas.microsoft.com/office/drawing/2014/main" id="{0F8E3E57-51A5-4B1B-BAC7-1154CF5148CB}"/>
               </a:ext>
             </a:extLst>
           </p:cNvPr>
@@ -18524,7 +18619,7 @@
           <p:cNvPr id="22" name="Arrow: Down 21">
             <a:extLst>
               <a:ext uri="{FF2B5EF4-FFF2-40B4-BE49-F238E27FC236}">
-                <a16:creationId xmlns:a16="http://schemas.microsoft.com/office/drawing/2014/main" xmlns="" id="{34D23DBF-655A-4926-AFB6-155FE201D9A8}"/>
+                <a16:creationId xmlns="" xmlns:a16="http://schemas.microsoft.com/office/drawing/2014/main" id="{34D23DBF-655A-4926-AFB6-155FE201D9A8}"/>
               </a:ext>
             </a:extLst>
           </p:cNvPr>
@@ -18570,7 +18665,7 @@
           <p:cNvPr id="23" name="Arrow: Down 22">
             <a:extLst>
               <a:ext uri="{FF2B5EF4-FFF2-40B4-BE49-F238E27FC236}">
-                <a16:creationId xmlns:a16="http://schemas.microsoft.com/office/drawing/2014/main" xmlns="" id="{1CDEB5A0-A1F2-44C2-9EB7-337E5B51ACC4}"/>
+                <a16:creationId xmlns="" xmlns:a16="http://schemas.microsoft.com/office/drawing/2014/main" id="{1CDEB5A0-A1F2-44C2-9EB7-337E5B51ACC4}"/>
               </a:ext>
             </a:extLst>
           </p:cNvPr>
@@ -18616,7 +18711,7 @@
           <p:cNvPr id="24" name="TextBox 23">
             <a:extLst>
               <a:ext uri="{FF2B5EF4-FFF2-40B4-BE49-F238E27FC236}">
-                <a16:creationId xmlns:a16="http://schemas.microsoft.com/office/drawing/2014/main" xmlns="" id="{FEA3DAEF-2413-4E2C-9834-9521FD01B307}"/>
+                <a16:creationId xmlns="" xmlns:a16="http://schemas.microsoft.com/office/drawing/2014/main" id="{FEA3DAEF-2413-4E2C-9834-9521FD01B307}"/>
               </a:ext>
             </a:extLst>
           </p:cNvPr>
@@ -18651,7 +18746,7 @@
           <p:cNvPr id="25" name="TextBox 24">
             <a:extLst>
               <a:ext uri="{FF2B5EF4-FFF2-40B4-BE49-F238E27FC236}">
-                <a16:creationId xmlns:a16="http://schemas.microsoft.com/office/drawing/2014/main" xmlns="" id="{50671145-C37D-45C4-9760-F126DC094D78}"/>
+                <a16:creationId xmlns="" xmlns:a16="http://schemas.microsoft.com/office/drawing/2014/main" id="{50671145-C37D-45C4-9760-F126DC094D78}"/>
               </a:ext>
             </a:extLst>
           </p:cNvPr>
@@ -18686,7 +18781,7 @@
           <p:cNvPr id="26" name="TextBox 25">
             <a:extLst>
               <a:ext uri="{FF2B5EF4-FFF2-40B4-BE49-F238E27FC236}">
-                <a16:creationId xmlns:a16="http://schemas.microsoft.com/office/drawing/2014/main" xmlns="" id="{F94DF2C2-5A09-4166-BC47-AC9515BBE17C}"/>
+                <a16:creationId xmlns="" xmlns:a16="http://schemas.microsoft.com/office/drawing/2014/main" id="{F94DF2C2-5A09-4166-BC47-AC9515BBE17C}"/>
               </a:ext>
             </a:extLst>
           </p:cNvPr>
@@ -18721,7 +18816,7 @@
           <p:cNvPr id="29" name="Content Placeholder 18">
             <a:extLst>
               <a:ext uri="{FF2B5EF4-FFF2-40B4-BE49-F238E27FC236}">
-                <a16:creationId xmlns:a16="http://schemas.microsoft.com/office/drawing/2014/main" xmlns="" id="{AE3FD8A2-161F-468F-997F-0580B8BAB986}"/>
+                <a16:creationId xmlns="" xmlns:a16="http://schemas.microsoft.com/office/drawing/2014/main" id="{AE3FD8A2-161F-468F-997F-0580B8BAB986}"/>
               </a:ext>
             </a:extLst>
           </p:cNvPr>
@@ -18750,21 +18845,21 @@
                 <a:gridCol w="2045383">
                   <a:extLst>
                     <a:ext uri="{9D8B030D-6E8A-4147-A177-3AD203B41FA5}">
-                      <a16:colId xmlns:a16="http://schemas.microsoft.com/office/drawing/2014/main" xmlns="" val="489640172"/>
+                      <a16:colId xmlns="" xmlns:a16="http://schemas.microsoft.com/office/drawing/2014/main" val="489640172"/>
                     </a:ext>
                   </a:extLst>
                 </a:gridCol>
                 <a:gridCol w="2228626">
                   <a:extLst>
                     <a:ext uri="{9D8B030D-6E8A-4147-A177-3AD203B41FA5}">
-                      <a16:colId xmlns:a16="http://schemas.microsoft.com/office/drawing/2014/main" xmlns="" val="854573195"/>
+                      <a16:colId xmlns="" xmlns:a16="http://schemas.microsoft.com/office/drawing/2014/main" val="854573195"/>
                     </a:ext>
                   </a:extLst>
                 </a:gridCol>
                 <a:gridCol w="3298366">
                   <a:extLst>
                     <a:ext uri="{9D8B030D-6E8A-4147-A177-3AD203B41FA5}">
-                      <a16:colId xmlns:a16="http://schemas.microsoft.com/office/drawing/2014/main" xmlns="" val="3791285653"/>
+                      <a16:colId xmlns="" xmlns:a16="http://schemas.microsoft.com/office/drawing/2014/main" val="3791285653"/>
                     </a:ext>
                   </a:extLst>
                 </a:gridCol>
@@ -18889,7 +18984,7 @@
                 </a:tc>
                 <a:extLst>
                   <a:ext uri="{0D108BD9-81ED-4DB2-BD59-A6C34878D82A}">
-                    <a16:rowId xmlns:a16="http://schemas.microsoft.com/office/drawing/2014/main" xmlns="" val="3291368365"/>
+                    <a16:rowId xmlns="" xmlns:a16="http://schemas.microsoft.com/office/drawing/2014/main" val="3291368365"/>
                   </a:ext>
                 </a:extLst>
               </a:tr>
@@ -18998,7 +19093,7 @@
                 </a:tc>
                 <a:extLst>
                   <a:ext uri="{0D108BD9-81ED-4DB2-BD59-A6C34878D82A}">
-                    <a16:rowId xmlns:a16="http://schemas.microsoft.com/office/drawing/2014/main" xmlns="" val="1035091340"/>
+                    <a16:rowId xmlns="" xmlns:a16="http://schemas.microsoft.com/office/drawing/2014/main" val="1035091340"/>
                   </a:ext>
                 </a:extLst>
               </a:tr>
@@ -19119,7 +19214,7 @@
                 </a:tc>
                 <a:extLst>
                   <a:ext uri="{0D108BD9-81ED-4DB2-BD59-A6C34878D82A}">
-                    <a16:rowId xmlns:a16="http://schemas.microsoft.com/office/drawing/2014/main" xmlns="" val="1266457433"/>
+                    <a16:rowId xmlns="" xmlns:a16="http://schemas.microsoft.com/office/drawing/2014/main" val="1266457433"/>
                   </a:ext>
                 </a:extLst>
               </a:tr>
@@ -19228,7 +19323,7 @@
                 </a:tc>
                 <a:extLst>
                   <a:ext uri="{0D108BD9-81ED-4DB2-BD59-A6C34878D82A}">
-                    <a16:rowId xmlns:a16="http://schemas.microsoft.com/office/drawing/2014/main" xmlns="" val="257687624"/>
+                    <a16:rowId xmlns="" xmlns:a16="http://schemas.microsoft.com/office/drawing/2014/main" val="257687624"/>
                   </a:ext>
                 </a:extLst>
               </a:tr>
@@ -19349,7 +19444,7 @@
                 </a:tc>
                 <a:extLst>
                   <a:ext uri="{0D108BD9-81ED-4DB2-BD59-A6C34878D82A}">
-                    <a16:rowId xmlns:a16="http://schemas.microsoft.com/office/drawing/2014/main" xmlns="" val="3172583602"/>
+                    <a16:rowId xmlns="" xmlns:a16="http://schemas.microsoft.com/office/drawing/2014/main" val="3172583602"/>
                   </a:ext>
                 </a:extLst>
               </a:tr>
@@ -19367,6 +19462,13 @@
   <p:clrMapOvr>
     <a:masterClrMapping/>
   </p:clrMapOvr>
+  <p:timing>
+    <p:tnLst>
+      <p:par>
+        <p:cTn id="1" dur="indefinite" restart="never" nodeType="tmRoot"/>
+      </p:par>
+    </p:tnLst>
+  </p:timing>
 </p:sld>
 </file>
 

</xml_diff>

<commit_message>
Fixed typos and inconsistent data
</commit_message>
<xml_diff>
--- a/Week5/Week5.pptx
+++ b/Week5/Week5.pptx
@@ -6280,7 +6280,27 @@
             </a:pPr>
             <a:r>
               <a:rPr lang="en-US" dirty="0"/>
-              <a:t>VALUES ("Jetson", 7);</a:t>
+              <a:t>VALUES </a:t>
+            </a:r>
+            <a:r>
+              <a:rPr lang="en-US" dirty="0" smtClean="0"/>
+              <a:t>(</a:t>
+            </a:r>
+            <a:r>
+              <a:rPr lang="en-US" dirty="0" smtClean="0"/>
+              <a:t>'</a:t>
+            </a:r>
+            <a:r>
+              <a:rPr lang="en-US" dirty="0" err="1" smtClean="0"/>
+              <a:t>Jetson</a:t>
+            </a:r>
+            <a:r>
+              <a:rPr lang="en-US" dirty="0"/>
+              <a:t>', </a:t>
+            </a:r>
+            <a:r>
+              <a:rPr lang="en-US" dirty="0"/>
+              <a:t>7);</a:t>
             </a:r>
           </a:p>
           <a:p>
@@ -8267,42 +8287,23 @@
                   </a:schemeClr>
                 </a:solidFill>
               </a:rPr>
-              <a:t>'This cat is named Charlie </a:t>
-            </a:r>
-          </a:p>
-          <a:p>
-            <a:pPr marL="0" indent="0">
-              <a:buNone/>
-            </a:pPr>
-            <a:r>
-              <a:rPr lang="en-US" dirty="0">
+              <a:t>'This cat is named </a:t>
+            </a:r>
+            <a:r>
+              <a:rPr lang="en-US" dirty="0" smtClean="0">
                 <a:solidFill>
                   <a:schemeClr val="accent3">
                     <a:lumMod val="75000"/>
                   </a:schemeClr>
                 </a:solidFill>
               </a:rPr>
-              <a:t>	      which is also a human name.</a:t>
-            </a:r>
-          </a:p>
-          <a:p>
-            <a:pPr marL="0" indent="0">
-              <a:buNone/>
-            </a:pPr>
-            <a:r>
-              <a:rPr lang="en-US" dirty="0">
-                <a:solidFill>
-                  <a:schemeClr val="accent3">
-                    <a:lumMod val="75000"/>
-                  </a:schemeClr>
-                </a:solidFill>
-              </a:rPr>
-              <a:t>	     In fact I know a couple of Charlies. Fun Fact’</a:t>
-            </a:r>
-            <a:r>
-              <a:rPr lang="en-US" dirty="0"/>
+              <a:t>Charlie’</a:t>
+            </a:r>
+            <a:r>
+              <a:rPr lang="en-US" dirty="0" smtClean="0"/>
               <a:t>)</a:t>
             </a:r>
+            <a:endParaRPr lang="en-US" dirty="0"/>
           </a:p>
           <a:p>
             <a:pPr marL="0" indent="0">
@@ -8339,6 +8340,13 @@
   <p:clrMapOvr>
     <a:masterClrMapping/>
   </p:clrMapOvr>
+  <p:timing>
+    <p:tnLst>
+      <p:par>
+        <p:cTn id="1" dur="indefinite" restart="never" nodeType="tmRoot"/>
+      </p:par>
+    </p:tnLst>
+  </p:timing>
 </p:sld>
 </file>
 
@@ -8412,18 +8420,26 @@
               <a:buNone/>
             </a:pPr>
             <a:r>
-              <a:rPr lang="en-US" dirty="0"/>
-              <a:t>INSERT INTO cats() </a:t>
-            </a:r>
-          </a:p>
-          <a:p>
-            <a:pPr marL="0" indent="0">
-              <a:buNone/>
-            </a:pPr>
-            <a:r>
-              <a:rPr lang="en-US" dirty="0"/>
-              <a:t>VALUES ();</a:t>
-            </a:r>
+              <a:rPr lang="en-US" dirty="0" smtClean="0"/>
+              <a:t>Now if we do SELECT * FROM </a:t>
+            </a:r>
+            <a:r>
+              <a:rPr lang="en-US" dirty="0" smtClean="0">
+                <a:solidFill>
+                  <a:schemeClr val="accent2">
+                    <a:lumMod val="75000"/>
+                  </a:schemeClr>
+                </a:solidFill>
+              </a:rPr>
+              <a:t>cats</a:t>
+            </a:r>
+            <a:endParaRPr lang="en-US" dirty="0">
+              <a:solidFill>
+                <a:schemeClr val="accent2">
+                  <a:lumMod val="75000"/>
+                </a:schemeClr>
+              </a:solidFill>
+            </a:endParaRPr>
           </a:p>
           <a:p>
             <a:pPr marL="0" indent="0">
@@ -8446,8 +8462,13 @@
             </a:pPr>
             <a:r>
               <a:rPr lang="en-US" dirty="0"/>
-              <a:t>And why NULL?</a:t>
-            </a:r>
+              <a:t>And why </a:t>
+            </a:r>
+            <a:r>
+              <a:rPr lang="en-US" dirty="0" smtClean="0"/>
+              <a:t>NULL in age column?</a:t>
+            </a:r>
+            <a:endParaRPr lang="en-US" dirty="0"/>
           </a:p>
           <a:p>
             <a:pPr marL="0" indent="0">
@@ -8472,52 +8493,6 @@
               <a:rPr lang="en-US" dirty="0"/>
               <a:t>It seems our table can accept new rows that do not have value!</a:t>
             </a:r>
-          </a:p>
-        </p:txBody>
-      </p:sp>
-      <p:sp>
-        <p:nvSpPr>
-          <p:cNvPr id="6" name="Arrow: Right 5">
-            <a:extLst>
-              <a:ext uri="{FF2B5EF4-FFF2-40B4-BE49-F238E27FC236}">
-                <a16:creationId xmlns="" xmlns:a16="http://schemas.microsoft.com/office/drawing/2014/main" id="{A3302394-896E-459E-9FD4-BF330C1AB43A}"/>
-              </a:ext>
-            </a:extLst>
-          </p:cNvPr>
-          <p:cNvSpPr/>
-          <p:nvPr/>
-        </p:nvSpPr>
-        <p:spPr>
-          <a:xfrm>
-            <a:off x="2837469" y="5062194"/>
-            <a:ext cx="254523" cy="122548"/>
-          </a:xfrm>
-          <a:prstGeom prst="rightArrow">
-            <a:avLst/>
-          </a:prstGeom>
-        </p:spPr>
-        <p:style>
-          <a:lnRef idx="2">
-            <a:schemeClr val="accent1">
-              <a:shade val="50000"/>
-            </a:schemeClr>
-          </a:lnRef>
-          <a:fillRef idx="1">
-            <a:schemeClr val="accent1"/>
-          </a:fillRef>
-          <a:effectRef idx="0">
-            <a:schemeClr val="accent1"/>
-          </a:effectRef>
-          <a:fontRef idx="minor">
-            <a:schemeClr val="lt1"/>
-          </a:fontRef>
-        </p:style>
-        <p:txBody>
-          <a:bodyPr rtlCol="0" anchor="ctr"/>
-          <a:lstStyle/>
-          <a:p>
-            <a:pPr algn="ctr"/>
-            <a:endParaRPr lang="en-US"/>
           </a:p>
         </p:txBody>
       </p:sp>
@@ -8531,6 +8506,13 @@
   <p:clrMapOvr>
     <a:masterClrMapping/>
   </p:clrMapOvr>
+  <p:timing>
+    <p:tnLst>
+      <p:par>
+        <p:cTn id="1" dur="indefinite" restart="never" nodeType="tmRoot"/>
+      </p:par>
+    </p:tnLst>
+  </p:timing>
 </p:sld>
 </file>
 
@@ -8752,6 +8734,13 @@
   <p:clrMapOvr>
     <a:masterClrMapping/>
   </p:clrMapOvr>
+  <p:timing>
+    <p:tnLst>
+      <p:par>
+        <p:cTn id="1" dur="indefinite" restart="never" nodeType="tmRoot"/>
+      </p:par>
+    </p:tnLst>
+  </p:timing>
 </p:sld>
 </file>
 
@@ -8924,6 +8913,13 @@
   <p:clrMapOvr>
     <a:masterClrMapping/>
   </p:clrMapOvr>
+  <p:timing>
+    <p:tnLst>
+      <p:par>
+        <p:cTn id="1" dur="indefinite" restart="never" nodeType="tmRoot"/>
+      </p:par>
+    </p:tnLst>
+  </p:timing>
 </p:sld>
 </file>
 
@@ -9168,6 +9164,13 @@
   <p:clrMapOvr>
     <a:masterClrMapping/>
   </p:clrMapOvr>
+  <p:timing>
+    <p:tnLst>
+      <p:par>
+        <p:cTn id="1" dur="indefinite" restart="never" nodeType="tmRoot"/>
+      </p:par>
+    </p:tnLst>
+  </p:timing>
 </p:sld>
 </file>
 
@@ -9486,6 +9489,13 @@
   <p:clrMapOvr>
     <a:masterClrMapping/>
   </p:clrMapOvr>
+  <p:timing>
+    <p:tnLst>
+      <p:par>
+        <p:cTn id="1" dur="indefinite" restart="never" nodeType="tmRoot"/>
+      </p:par>
+    </p:tnLst>
+  </p:timing>
 </p:sld>
 </file>
 
@@ -9553,7 +9563,7 @@
         <p:spPr/>
         <p:txBody>
           <a:bodyPr>
-            <a:normAutofit fontScale="85000" lnSpcReduction="20000"/>
+            <a:normAutofit fontScale="62500" lnSpcReduction="20000"/>
           </a:bodyPr>
           <a:lstStyle/>
           <a:p>
@@ -9770,8 +9780,36 @@
             </a:r>
             <a:r>
               <a:rPr lang="en-US" dirty="0"/>
-              <a:t>, name, age) VALUES(1, 'James', 3);</a:t>
-            </a:r>
+              <a:t>, name, age) </a:t>
+            </a:r>
+            <a:r>
+              <a:rPr lang="en-US" dirty="0" smtClean="0"/>
+              <a:t>VALUES(3, </a:t>
+            </a:r>
+            <a:r>
+              <a:rPr lang="en-US" dirty="0"/>
+              <a:t>'James', </a:t>
+            </a:r>
+            <a:r>
+              <a:rPr lang="en-US" dirty="0" smtClean="0"/>
+              <a:t>1);</a:t>
+            </a:r>
+          </a:p>
+          <a:p>
+            <a:endParaRPr lang="en-US" dirty="0"/>
+          </a:p>
+          <a:p>
+            <a:r>
+              <a:rPr lang="en-US" dirty="0" smtClean="0"/>
+              <a:t>Try inserting same ID (we previously inserted) and see what happens </a:t>
+            </a:r>
+            <a:r>
+              <a:rPr lang="en-US" dirty="0" smtClean="0">
+                <a:sym typeface="Wingdings" panose="05000000000000000000" pitchFamily="2" charset="2"/>
+              </a:rPr>
+              <a:t></a:t>
+            </a:r>
+            <a:endParaRPr lang="en-US" dirty="0"/>
           </a:p>
           <a:p>
             <a:pPr marL="0" indent="0">
@@ -9791,6 +9829,13 @@
   <p:clrMapOvr>
     <a:masterClrMapping/>
   </p:clrMapOvr>
+  <p:timing>
+    <p:tnLst>
+      <p:par>
+        <p:cTn id="1" dur="indefinite" restart="never" nodeType="tmRoot"/>
+      </p:par>
+    </p:tnLst>
+  </p:timing>
 </p:sld>
 </file>
 
@@ -9917,17 +9962,18 @@
               <a:t>NOT NULL </a:t>
             </a:r>
             <a:r>
-              <a:rPr lang="en-US" dirty="0">
+              <a:rPr lang="en-US" dirty="0" smtClean="0">
                 <a:solidFill>
                   <a:srgbClr val="FF0000"/>
                 </a:solidFill>
               </a:rPr>
-              <a:t>AUTO_INCREMENT </a:t>
-            </a:r>
-            <a:r>
-              <a:rPr lang="en-US" dirty="0"/>
+              <a:t>IDENTITY</a:t>
+            </a:r>
+            <a:r>
+              <a:rPr lang="en-US" dirty="0" smtClean="0"/>
               <a:t>,</a:t>
             </a:r>
+            <a:endParaRPr lang="en-US" dirty="0"/>
           </a:p>
           <a:p>
             <a:pPr marL="0" indent="0">
@@ -10000,6 +10046,13 @@
   <p:clrMapOvr>
     <a:masterClrMapping/>
   </p:clrMapOvr>
+  <p:timing>
+    <p:tnLst>
+      <p:par>
+        <p:cTn id="1" dur="indefinite" restart="never" nodeType="tmRoot"/>
+      </p:par>
+    </p:tnLst>
+  </p:timing>
 </p:sld>
 </file>
 
@@ -10232,6 +10285,13 @@
   <p:clrMapOvr>
     <a:masterClrMapping/>
   </p:clrMapOvr>
+  <p:timing>
+    <p:tnLst>
+      <p:par>
+        <p:cTn id="1" dur="indefinite" restart="never" nodeType="tmRoot"/>
+      </p:par>
+    </p:tnLst>
+  </p:timing>
 </p:sld>
 </file>
 
@@ -10365,12 +10425,13 @@
                   </a:schemeClr>
                 </a:solidFill>
               </a:rPr>
-              <a:t>AUTO_INCREMENT</a:t>
-            </a:r>
-            <a:r>
-              <a:rPr lang="en-US" dirty="0"/>
+              <a:t>IDENTITY</a:t>
+            </a:r>
+            <a:r>
+              <a:rPr lang="en-US" dirty="0" smtClean="0"/>
               <a:t>,</a:t>
             </a:r>
+            <a:endParaRPr lang="en-US" dirty="0"/>
           </a:p>
           <a:p>
             <a:pPr marL="0" indent="0">
@@ -10620,6 +10681,13 @@
   <p:clrMapOvr>
     <a:masterClrMapping/>
   </p:clrMapOvr>
+  <p:timing>
+    <p:tnLst>
+      <p:par>
+        <p:cTn id="1" dur="indefinite" restart="never" nodeType="tmRoot"/>
+      </p:par>
+    </p:tnLst>
+  </p:timing>
 </p:sld>
 </file>
 
@@ -10989,7 +11057,7 @@
               <a:t>NOT NULL </a:t>
             </a:r>
             <a:r>
-              <a:rPr lang="en-US" dirty="0">
+              <a:rPr lang="en-US" dirty="0" smtClean="0">
                 <a:solidFill>
                   <a:schemeClr val="accent1">
                     <a:lumMod val="60000"/>
@@ -10997,7 +11065,17 @@
                   </a:schemeClr>
                 </a:solidFill>
               </a:rPr>
-              <a:t>AUTO_INCREMENT </a:t>
+              <a:t>IDENTITY </a:t>
+            </a:r>
+            <a:r>
+              <a:rPr lang="en-US" dirty="0" smtClean="0">
+                <a:solidFill>
+                  <a:schemeClr val="accent1">
+                    <a:lumMod val="75000"/>
+                  </a:schemeClr>
+                </a:solidFill>
+              </a:rPr>
+              <a:t>PRIMARY </a:t>
             </a:r>
             <a:r>
               <a:rPr lang="en-US" dirty="0">
@@ -11007,7 +11085,7 @@
                   </a:schemeClr>
                 </a:solidFill>
               </a:rPr>
-              <a:t>PRIMARY KEY</a:t>
+              <a:t>KEY</a:t>
             </a:r>
             <a:r>
               <a:rPr lang="en-US" dirty="0"/>
@@ -11239,6 +11317,13 @@
   <p:clrMapOvr>
     <a:masterClrMapping/>
   </p:clrMapOvr>
+  <p:timing>
+    <p:tnLst>
+      <p:par>
+        <p:cTn id="1" dur="indefinite" restart="never" nodeType="tmRoot"/>
+      </p:par>
+    </p:tnLst>
+  </p:timing>
 </p:sld>
 </file>
 
@@ -11375,6 +11460,13 @@
   <p:clrMapOvr>
     <a:masterClrMapping/>
   </p:clrMapOvr>
+  <p:timing>
+    <p:tnLst>
+      <p:par>
+        <p:cTn id="1" dur="indefinite" restart="never" nodeType="tmRoot"/>
+      </p:par>
+    </p:tnLst>
+  </p:timing>
 </p:sld>
 </file>
 
@@ -11664,6 +11756,13 @@
   <p:clrMapOvr>
     <a:masterClrMapping/>
   </p:clrMapOvr>
+  <p:timing>
+    <p:tnLst>
+      <p:par>
+        <p:cTn id="1" dur="indefinite" restart="never" nodeType="tmRoot"/>
+      </p:par>
+    </p:tnLst>
+  </p:timing>
 </p:sld>
 </file>
 
@@ -11875,9 +11974,12 @@
                   <a:srgbClr val="00B050"/>
                 </a:solidFill>
               </a:rPr>
-              <a:t>product_description - text</a:t>
-            </a:r>
-            <a:endParaRPr lang="sr-Latn-ME" dirty="0"/>
+              <a:t>product_description </a:t>
+            </a:r>
+            <a:r>
+              <a:rPr lang="sr-Latn-ME" dirty="0"/>
+              <a:t>- text</a:t>
+            </a:r>
           </a:p>
           <a:p>
             <a:pPr fontAlgn="base"/>
@@ -11920,6 +12022,13 @@
   <p:clrMapOvr>
     <a:masterClrMapping/>
   </p:clrMapOvr>
+  <p:timing>
+    <p:tnLst>
+      <p:par>
+        <p:cTn id="1" dur="indefinite" restart="never" nodeType="tmRoot"/>
+      </p:par>
+    </p:tnLst>
+  </p:timing>
 </p:sld>
 </file>
 

</xml_diff>